<commit_message>
tracking camera용 dummy target 생성해야함.
</commit_message>
<xml_diff>
--- a/VisualX/[20141117]전장가시화 3D 객체_항목.pptx
+++ b/VisualX/[20141117]전장가시화 3D 객체_항목.pptx
@@ -5843,6 +5843,70 @@
           </a:extLst>
         </p:spPr>
       </p:pic>
+      <p:sp>
+        <p:nvSpPr>
+          <p:cNvPr id="9" name="TextBox 8"/>
+          <p:cNvSpPr txBox="1"/>
+          <p:nvPr/>
+        </p:nvSpPr>
+        <p:spPr>
+          <a:xfrm>
+            <a:off x="5796136" y="548680"/>
+            <a:ext cx="2664296" cy="923330"/>
+          </a:xfrm>
+          <a:prstGeom prst="rect">
+            <a:avLst/>
+          </a:prstGeom>
+          <a:solidFill>
+            <a:srgbClr val="FF0000"/>
+          </a:solidFill>
+        </p:spPr>
+        <p:txBody>
+          <a:bodyPr wrap="square" rtlCol="0">
+            <a:spAutoFit/>
+          </a:bodyPr>
+          <a:lstStyle/>
+          <a:p>
+            <a:r>
+              <a:rPr lang="ko-KR" altLang="en-US" b="1" dirty="0" smtClean="0">
+                <a:solidFill>
+                  <a:schemeClr val="bg1"/>
+                </a:solidFill>
+              </a:rPr>
+              <a:t>아래 </a:t>
+            </a:r>
+            <a:r>
+              <a:rPr lang="en-US" altLang="ko-KR" b="1" dirty="0" smtClean="0">
+                <a:solidFill>
+                  <a:schemeClr val="bg1"/>
+                </a:solidFill>
+              </a:rPr>
+              <a:t>launcher</a:t>
+            </a:r>
+            <a:r>
+              <a:rPr lang="ko-KR" altLang="en-US" b="1" dirty="0" smtClean="0">
+                <a:solidFill>
+                  <a:schemeClr val="bg1"/>
+                </a:solidFill>
+              </a:rPr>
+              <a:t>는 배 모델에 포함되어 있어야 함</a:t>
+            </a:r>
+            <a:r>
+              <a:rPr lang="en-US" altLang="ko-KR" b="1" dirty="0" smtClean="0">
+                <a:solidFill>
+                  <a:schemeClr val="bg1"/>
+                </a:solidFill>
+              </a:rPr>
+              <a:t>.</a:t>
+            </a:r>
+            <a:endParaRPr lang="ko-KR" altLang="en-US" b="1" dirty="0">
+              <a:solidFill>
+                <a:schemeClr val="bg1"/>
+              </a:solidFill>
+            </a:endParaRPr>
+          </a:p>
+        </p:txBody>
+      </p:sp>
     </p:spTree>
     <p:extLst>
       <p:ext uri="{BB962C8B-B14F-4D97-AF65-F5344CB8AC3E}">

</xml_diff>

<commit_message>
complete animation for collision test
</commit_message>
<xml_diff>
--- a/VisualX/[20141117]전장가시화 3D 객체_항목.pptx
+++ b/VisualX/[20141117]전장가시화 3D 객체_항목.pptx
@@ -301,7 +301,7 @@
             <a:fld id="{FB30EDBD-1C2D-4C1E-B459-B60219FAB484}" type="datetimeFigureOut">
               <a:rPr lang="ko-KR" altLang="en-US" smtClean="0"/>
               <a:pPr/>
-              <a:t>2015-01-18</a:t>
+              <a:t>2015-02-04</a:t>
             </a:fld>
             <a:endParaRPr lang="ko-KR" altLang="en-US"/>
           </a:p>
@@ -468,7 +468,7 @@
             <a:fld id="{FB30EDBD-1C2D-4C1E-B459-B60219FAB484}" type="datetimeFigureOut">
               <a:rPr lang="ko-KR" altLang="en-US" smtClean="0"/>
               <a:pPr/>
-              <a:t>2015-01-18</a:t>
+              <a:t>2015-02-04</a:t>
             </a:fld>
             <a:endParaRPr lang="ko-KR" altLang="en-US"/>
           </a:p>
@@ -645,7 +645,7 @@
             <a:fld id="{FB30EDBD-1C2D-4C1E-B459-B60219FAB484}" type="datetimeFigureOut">
               <a:rPr lang="ko-KR" altLang="en-US" smtClean="0"/>
               <a:pPr/>
-              <a:t>2015-01-18</a:t>
+              <a:t>2015-02-04</a:t>
             </a:fld>
             <a:endParaRPr lang="ko-KR" altLang="en-US"/>
           </a:p>
@@ -812,7 +812,7 @@
             <a:fld id="{FB30EDBD-1C2D-4C1E-B459-B60219FAB484}" type="datetimeFigureOut">
               <a:rPr lang="ko-KR" altLang="en-US" smtClean="0"/>
               <a:pPr/>
-              <a:t>2015-01-18</a:t>
+              <a:t>2015-02-04</a:t>
             </a:fld>
             <a:endParaRPr lang="ko-KR" altLang="en-US"/>
           </a:p>
@@ -1055,7 +1055,7 @@
             <a:fld id="{FB30EDBD-1C2D-4C1E-B459-B60219FAB484}" type="datetimeFigureOut">
               <a:rPr lang="ko-KR" altLang="en-US" smtClean="0"/>
               <a:pPr/>
-              <a:t>2015-01-18</a:t>
+              <a:t>2015-02-04</a:t>
             </a:fld>
             <a:endParaRPr lang="ko-KR" altLang="en-US"/>
           </a:p>
@@ -1340,7 +1340,7 @@
             <a:fld id="{FB30EDBD-1C2D-4C1E-B459-B60219FAB484}" type="datetimeFigureOut">
               <a:rPr lang="ko-KR" altLang="en-US" smtClean="0"/>
               <a:pPr/>
-              <a:t>2015-01-18</a:t>
+              <a:t>2015-02-04</a:t>
             </a:fld>
             <a:endParaRPr lang="ko-KR" altLang="en-US"/>
           </a:p>
@@ -1759,7 +1759,7 @@
             <a:fld id="{FB30EDBD-1C2D-4C1E-B459-B60219FAB484}" type="datetimeFigureOut">
               <a:rPr lang="ko-KR" altLang="en-US" smtClean="0"/>
               <a:pPr/>
-              <a:t>2015-01-18</a:t>
+              <a:t>2015-02-04</a:t>
             </a:fld>
             <a:endParaRPr lang="ko-KR" altLang="en-US"/>
           </a:p>
@@ -1874,7 +1874,7 @@
             <a:fld id="{FB30EDBD-1C2D-4C1E-B459-B60219FAB484}" type="datetimeFigureOut">
               <a:rPr lang="ko-KR" altLang="en-US" smtClean="0"/>
               <a:pPr/>
-              <a:t>2015-01-18</a:t>
+              <a:t>2015-02-04</a:t>
             </a:fld>
             <a:endParaRPr lang="ko-KR" altLang="en-US"/>
           </a:p>
@@ -1966,7 +1966,7 @@
             <a:fld id="{FB30EDBD-1C2D-4C1E-B459-B60219FAB484}" type="datetimeFigureOut">
               <a:rPr lang="ko-KR" altLang="en-US" smtClean="0"/>
               <a:pPr/>
-              <a:t>2015-01-18</a:t>
+              <a:t>2015-02-04</a:t>
             </a:fld>
             <a:endParaRPr lang="ko-KR" altLang="en-US"/>
           </a:p>
@@ -2240,7 +2240,7 @@
             <a:fld id="{FB30EDBD-1C2D-4C1E-B459-B60219FAB484}" type="datetimeFigureOut">
               <a:rPr lang="ko-KR" altLang="en-US" smtClean="0"/>
               <a:pPr/>
-              <a:t>2015-01-18</a:t>
+              <a:t>2015-02-04</a:t>
             </a:fld>
             <a:endParaRPr lang="ko-KR" altLang="en-US"/>
           </a:p>
@@ -2490,7 +2490,7 @@
             <a:fld id="{FB30EDBD-1C2D-4C1E-B459-B60219FAB484}" type="datetimeFigureOut">
               <a:rPr lang="ko-KR" altLang="en-US" smtClean="0"/>
               <a:pPr/>
-              <a:t>2015-01-18</a:t>
+              <a:t>2015-02-04</a:t>
             </a:fld>
             <a:endParaRPr lang="ko-KR" altLang="en-US"/>
           </a:p>
@@ -2700,7 +2700,7 @@
             <a:fld id="{FB30EDBD-1C2D-4C1E-B459-B60219FAB484}" type="datetimeFigureOut">
               <a:rPr lang="ko-KR" altLang="en-US" smtClean="0"/>
               <a:pPr/>
-              <a:t>2015-01-18</a:t>
+              <a:t>2015-02-04</a:t>
             </a:fld>
             <a:endParaRPr lang="ko-KR" altLang="en-US"/>
           </a:p>
@@ -3359,14 +3359,14 @@
           <a:effectLst/>
           <a:extLst>
             <a:ext uri="{909E8E84-426E-40DD-AFC4-6F175D3DCCD1}">
-              <a14:hiddenFill xmlns:a14="http://schemas.microsoft.com/office/drawing/2010/main" xmlns="">
+              <a14:hiddenFill xmlns="" xmlns:a14="http://schemas.microsoft.com/office/drawing/2010/main">
                 <a:solidFill>
                   <a:schemeClr val="accent1"/>
                 </a:solidFill>
               </a14:hiddenFill>
             </a:ext>
             <a:ext uri="{91240B29-F687-4F45-9708-019B960494DF}">
-              <a14:hiddenLine xmlns:a14="http://schemas.microsoft.com/office/drawing/2010/main" xmlns="" w="9525">
+              <a14:hiddenLine xmlns="" xmlns:a14="http://schemas.microsoft.com/office/drawing/2010/main" w="9525">
                 <a:solidFill>
                   <a:schemeClr val="tx1"/>
                 </a:solidFill>
@@ -3376,7 +3376,7 @@
               </a14:hiddenLine>
             </a:ext>
             <a:ext uri="{AF507438-7753-43E0-B8FC-AC1667EBCBE1}">
-              <a14:hiddenEffects xmlns:a14="http://schemas.microsoft.com/office/drawing/2010/main" xmlns="">
+              <a14:hiddenEffects xmlns="" xmlns:a14="http://schemas.microsoft.com/office/drawing/2010/main">
                 <a:effectLst>
                   <a:outerShdw dist="35921" dir="2700000" algn="ctr" rotWithShape="0">
                     <a:schemeClr val="bg2"/>
@@ -3411,7 +3411,7 @@
           <a:blip r:embed="rId2" cstate="print">
             <a:extLst>
               <a:ext uri="{28A0092B-C50C-407E-A947-70E740481C1C}">
-                <a14:useLocalDpi xmlns:a14="http://schemas.microsoft.com/office/drawing/2010/main" xmlns="" val="0"/>
+                <a14:useLocalDpi xmlns="" xmlns:a14="http://schemas.microsoft.com/office/drawing/2010/main" val="0"/>
               </a:ext>
             </a:extLst>
           </a:blip>
@@ -3434,14 +3434,14 @@
           </a:ln>
           <a:extLst>
             <a:ext uri="{909E8E84-426E-40DD-AFC4-6F175D3DCCD1}">
-              <a14:hiddenFill xmlns:a14="http://schemas.microsoft.com/office/drawing/2010/main" xmlns="">
+              <a14:hiddenFill xmlns="" xmlns:a14="http://schemas.microsoft.com/office/drawing/2010/main">
                 <a:solidFill>
                   <a:schemeClr val="accent1"/>
                 </a:solidFill>
               </a14:hiddenFill>
             </a:ext>
             <a:ext uri="{91240B29-F687-4F45-9708-019B960494DF}">
-              <a14:hiddenLine xmlns:a14="http://schemas.microsoft.com/office/drawing/2010/main" xmlns="" w="9525">
+              <a14:hiddenLine xmlns="" xmlns:a14="http://schemas.microsoft.com/office/drawing/2010/main" w="9525">
                 <a:solidFill>
                   <a:schemeClr val="tx1"/>
                 </a:solidFill>
@@ -3465,7 +3465,7 @@
           <a:blip r:embed="rId3" cstate="print">
             <a:extLst>
               <a:ext uri="{28A0092B-C50C-407E-A947-70E740481C1C}">
-                <a14:useLocalDpi xmlns:a14="http://schemas.microsoft.com/office/drawing/2010/main" xmlns="" val="0"/>
+                <a14:useLocalDpi xmlns="" xmlns:a14="http://schemas.microsoft.com/office/drawing/2010/main" val="0"/>
               </a:ext>
             </a:extLst>
           </a:blip>
@@ -3488,14 +3488,14 @@
           </a:ln>
           <a:extLst>
             <a:ext uri="{909E8E84-426E-40DD-AFC4-6F175D3DCCD1}">
-              <a14:hiddenFill xmlns:a14="http://schemas.microsoft.com/office/drawing/2010/main" xmlns="">
+              <a14:hiddenFill xmlns="" xmlns:a14="http://schemas.microsoft.com/office/drawing/2010/main">
                 <a:solidFill>
                   <a:schemeClr val="accent1"/>
                 </a:solidFill>
               </a14:hiddenFill>
             </a:ext>
             <a:ext uri="{91240B29-F687-4F45-9708-019B960494DF}">
-              <a14:hiddenLine xmlns:a14="http://schemas.microsoft.com/office/drawing/2010/main" xmlns="" w="9525">
+              <a14:hiddenLine xmlns="" xmlns:a14="http://schemas.microsoft.com/office/drawing/2010/main" w="9525">
                 <a:solidFill>
                   <a:schemeClr val="tx1"/>
                 </a:solidFill>
@@ -3519,7 +3519,7 @@
           <a:blip r:embed="rId4" cstate="print">
             <a:extLst>
               <a:ext uri="{28A0092B-C50C-407E-A947-70E740481C1C}">
-                <a14:useLocalDpi xmlns:a14="http://schemas.microsoft.com/office/drawing/2010/main" xmlns="" val="0"/>
+                <a14:useLocalDpi xmlns="" xmlns:a14="http://schemas.microsoft.com/office/drawing/2010/main" val="0"/>
               </a:ext>
             </a:extLst>
           </a:blip>
@@ -3542,14 +3542,14 @@
           </a:ln>
           <a:extLst>
             <a:ext uri="{909E8E84-426E-40DD-AFC4-6F175D3DCCD1}">
-              <a14:hiddenFill xmlns:a14="http://schemas.microsoft.com/office/drawing/2010/main" xmlns="">
+              <a14:hiddenFill xmlns="" xmlns:a14="http://schemas.microsoft.com/office/drawing/2010/main">
                 <a:solidFill>
                   <a:schemeClr val="accent1"/>
                 </a:solidFill>
               </a14:hiddenFill>
             </a:ext>
             <a:ext uri="{91240B29-F687-4F45-9708-019B960494DF}">
-              <a14:hiddenLine xmlns:a14="http://schemas.microsoft.com/office/drawing/2010/main" xmlns="" w="9525">
+              <a14:hiddenLine xmlns="" xmlns:a14="http://schemas.microsoft.com/office/drawing/2010/main" w="9525">
                 <a:solidFill>
                   <a:schemeClr val="tx1"/>
                 </a:solidFill>
@@ -3561,10 +3561,54 @@
           </a:extLst>
         </p:spPr>
       </p:pic>
+      <p:sp>
+        <p:nvSpPr>
+          <p:cNvPr id="8" name="TextBox 7"/>
+          <p:cNvSpPr txBox="1"/>
+          <p:nvPr/>
+        </p:nvSpPr>
+        <p:spPr>
+          <a:xfrm>
+            <a:off x="6156176" y="620688"/>
+            <a:ext cx="1296144" cy="369332"/>
+          </a:xfrm>
+          <a:prstGeom prst="rect">
+            <a:avLst/>
+          </a:prstGeom>
+          <a:solidFill>
+            <a:srgbClr val="FF0000"/>
+          </a:solidFill>
+        </p:spPr>
+        <p:txBody>
+          <a:bodyPr wrap="square" rtlCol="0">
+            <a:spAutoFit/>
+          </a:bodyPr>
+          <a:lstStyle/>
+          <a:p>
+            <a:r>
+              <a:rPr lang="ko-KR" altLang="en-US" b="1" dirty="0" smtClean="0">
+                <a:solidFill>
+                  <a:schemeClr val="bg1">
+                    <a:lumMod val="95000"/>
+                  </a:schemeClr>
+                </a:solidFill>
+              </a:rPr>
+              <a:t>모델확인</a:t>
+            </a:r>
+            <a:endParaRPr lang="ko-KR" altLang="en-US" b="1" dirty="0">
+              <a:solidFill>
+                <a:schemeClr val="bg1">
+                  <a:lumMod val="95000"/>
+                </a:schemeClr>
+              </a:solidFill>
+            </a:endParaRPr>
+          </a:p>
+        </p:txBody>
+      </p:sp>
     </p:spTree>
     <p:extLst>
       <p:ext uri="{BB962C8B-B14F-4D97-AF65-F5344CB8AC3E}">
-        <p14:creationId xmlns:p14="http://schemas.microsoft.com/office/powerpoint/2010/main" xmlns="" val="2431875864"/>
+        <p14:creationId xmlns="" xmlns:p14="http://schemas.microsoft.com/office/powerpoint/2010/main" val="2431875864"/>
       </p:ext>
     </p:extLst>
   </p:cSld>
@@ -4002,14 +4046,14 @@
           <a:effectLst/>
           <a:extLst>
             <a:ext uri="{909E8E84-426E-40DD-AFC4-6F175D3DCCD1}">
-              <a14:hiddenFill xmlns:a14="http://schemas.microsoft.com/office/drawing/2010/main" xmlns="">
+              <a14:hiddenFill xmlns="" xmlns:a14="http://schemas.microsoft.com/office/drawing/2010/main">
                 <a:solidFill>
                   <a:schemeClr val="accent1"/>
                 </a:solidFill>
               </a14:hiddenFill>
             </a:ext>
             <a:ext uri="{91240B29-F687-4F45-9708-019B960494DF}">
-              <a14:hiddenLine xmlns:a14="http://schemas.microsoft.com/office/drawing/2010/main" xmlns="" w="9525">
+              <a14:hiddenLine xmlns="" xmlns:a14="http://schemas.microsoft.com/office/drawing/2010/main" w="9525">
                 <a:solidFill>
                   <a:schemeClr val="tx1"/>
                 </a:solidFill>
@@ -4019,7 +4063,7 @@
               </a14:hiddenLine>
             </a:ext>
             <a:ext uri="{AF507438-7753-43E0-B8FC-AC1667EBCBE1}">
-              <a14:hiddenEffects xmlns:a14="http://schemas.microsoft.com/office/drawing/2010/main" xmlns="">
+              <a14:hiddenEffects xmlns="" xmlns:a14="http://schemas.microsoft.com/office/drawing/2010/main">
                 <a:effectLst>
                   <a:outerShdw dist="35921" dir="2700000" algn="ctr" rotWithShape="0">
                     <a:schemeClr val="bg2"/>
@@ -4065,14 +4109,14 @@
           <a:effectLst/>
           <a:extLst>
             <a:ext uri="{909E8E84-426E-40DD-AFC4-6F175D3DCCD1}">
-              <a14:hiddenFill xmlns:a14="http://schemas.microsoft.com/office/drawing/2010/main" xmlns="">
+              <a14:hiddenFill xmlns="" xmlns:a14="http://schemas.microsoft.com/office/drawing/2010/main">
                 <a:solidFill>
                   <a:schemeClr val="accent1"/>
                 </a:solidFill>
               </a14:hiddenFill>
             </a:ext>
             <a:ext uri="{91240B29-F687-4F45-9708-019B960494DF}">
-              <a14:hiddenLine xmlns:a14="http://schemas.microsoft.com/office/drawing/2010/main" xmlns="" w="9525">
+              <a14:hiddenLine xmlns="" xmlns:a14="http://schemas.microsoft.com/office/drawing/2010/main" w="9525">
                 <a:solidFill>
                   <a:schemeClr val="tx1"/>
                 </a:solidFill>
@@ -4082,7 +4126,7 @@
               </a14:hiddenLine>
             </a:ext>
             <a:ext uri="{AF507438-7753-43E0-B8FC-AC1667EBCBE1}">
-              <a14:hiddenEffects xmlns:a14="http://schemas.microsoft.com/office/drawing/2010/main" xmlns="">
+              <a14:hiddenEffects xmlns="" xmlns:a14="http://schemas.microsoft.com/office/drawing/2010/main">
                 <a:effectLst>
                   <a:outerShdw dist="35921" dir="2700000" algn="ctr" rotWithShape="0">
                     <a:schemeClr val="bg2"/>
@@ -4128,14 +4172,14 @@
           <a:effectLst/>
           <a:extLst>
             <a:ext uri="{909E8E84-426E-40DD-AFC4-6F175D3DCCD1}">
-              <a14:hiddenFill xmlns:a14="http://schemas.microsoft.com/office/drawing/2010/main" xmlns="">
+              <a14:hiddenFill xmlns="" xmlns:a14="http://schemas.microsoft.com/office/drawing/2010/main">
                 <a:solidFill>
                   <a:schemeClr val="accent1"/>
                 </a:solidFill>
               </a14:hiddenFill>
             </a:ext>
             <a:ext uri="{91240B29-F687-4F45-9708-019B960494DF}">
-              <a14:hiddenLine xmlns:a14="http://schemas.microsoft.com/office/drawing/2010/main" xmlns="" w="9525">
+              <a14:hiddenLine xmlns="" xmlns:a14="http://schemas.microsoft.com/office/drawing/2010/main" w="9525">
                 <a:solidFill>
                   <a:schemeClr val="tx1"/>
                 </a:solidFill>
@@ -4145,7 +4189,7 @@
               </a14:hiddenLine>
             </a:ext>
             <a:ext uri="{AF507438-7753-43E0-B8FC-AC1667EBCBE1}">
-              <a14:hiddenEffects xmlns:a14="http://schemas.microsoft.com/office/drawing/2010/main" xmlns="">
+              <a14:hiddenEffects xmlns="" xmlns:a14="http://schemas.microsoft.com/office/drawing/2010/main">
                 <a:effectLst>
                   <a:outerShdw dist="35921" dir="2700000" algn="ctr" rotWithShape="0">
                     <a:schemeClr val="bg2"/>
@@ -4180,7 +4224,7 @@
           <a:blip r:embed="rId3" cstate="print">
             <a:extLst>
               <a:ext uri="{28A0092B-C50C-407E-A947-70E740481C1C}">
-                <a14:useLocalDpi xmlns:a14="http://schemas.microsoft.com/office/drawing/2010/main" xmlns="" val="0"/>
+                <a14:useLocalDpi xmlns="" xmlns:a14="http://schemas.microsoft.com/office/drawing/2010/main" val="0"/>
               </a:ext>
             </a:extLst>
           </a:blip>
@@ -4200,7 +4244,7 @@
           <a:noFill/>
           <a:extLst>
             <a:ext uri="{909E8E84-426E-40DD-AFC4-6F175D3DCCD1}">
-              <a14:hiddenFill xmlns:a14="http://schemas.microsoft.com/office/drawing/2010/main" xmlns="">
+              <a14:hiddenFill xmlns="" xmlns:a14="http://schemas.microsoft.com/office/drawing/2010/main">
                 <a:solidFill>
                   <a:srgbClr val="FFFFFF"/>
                 </a:solidFill>
@@ -4221,7 +4265,7 @@
           <a:blip r:embed="rId4" cstate="print">
             <a:extLst>
               <a:ext uri="{28A0092B-C50C-407E-A947-70E740481C1C}">
-                <a14:useLocalDpi xmlns:a14="http://schemas.microsoft.com/office/drawing/2010/main" xmlns="" val="0"/>
+                <a14:useLocalDpi xmlns="" xmlns:a14="http://schemas.microsoft.com/office/drawing/2010/main" val="0"/>
               </a:ext>
             </a:extLst>
           </a:blip>
@@ -4241,7 +4285,7 @@
           <a:noFill/>
           <a:extLst>
             <a:ext uri="{909E8E84-426E-40DD-AFC4-6F175D3DCCD1}">
-              <a14:hiddenFill xmlns:a14="http://schemas.microsoft.com/office/drawing/2010/main" xmlns="">
+              <a14:hiddenFill xmlns="" xmlns:a14="http://schemas.microsoft.com/office/drawing/2010/main">
                 <a:solidFill>
                   <a:srgbClr val="FFFFFF"/>
                 </a:solidFill>
@@ -4262,7 +4306,7 @@
           <a:blip r:embed="rId5" cstate="print">
             <a:extLst>
               <a:ext uri="{28A0092B-C50C-407E-A947-70E740481C1C}">
-                <a14:useLocalDpi xmlns:a14="http://schemas.microsoft.com/office/drawing/2010/main" xmlns="" val="0"/>
+                <a14:useLocalDpi xmlns="" xmlns:a14="http://schemas.microsoft.com/office/drawing/2010/main" val="0"/>
               </a:ext>
             </a:extLst>
           </a:blip>
@@ -4282,7 +4326,7 @@
           <a:noFill/>
           <a:extLst>
             <a:ext uri="{909E8E84-426E-40DD-AFC4-6F175D3DCCD1}">
-              <a14:hiddenFill xmlns:a14="http://schemas.microsoft.com/office/drawing/2010/main" xmlns="">
+              <a14:hiddenFill xmlns="" xmlns:a14="http://schemas.microsoft.com/office/drawing/2010/main">
                 <a:solidFill>
                   <a:srgbClr val="FFFFFF"/>
                 </a:solidFill>
@@ -4303,7 +4347,7 @@
           <a:blip r:embed="rId6" cstate="print">
             <a:extLst>
               <a:ext uri="{28A0092B-C50C-407E-A947-70E740481C1C}">
-                <a14:useLocalDpi xmlns:a14="http://schemas.microsoft.com/office/drawing/2010/main" xmlns="" val="0"/>
+                <a14:useLocalDpi xmlns="" xmlns:a14="http://schemas.microsoft.com/office/drawing/2010/main" val="0"/>
               </a:ext>
             </a:extLst>
           </a:blip>
@@ -4323,7 +4367,7 @@
           <a:noFill/>
           <a:extLst>
             <a:ext uri="{909E8E84-426E-40DD-AFC4-6F175D3DCCD1}">
-              <a14:hiddenFill xmlns:a14="http://schemas.microsoft.com/office/drawing/2010/main" xmlns="">
+              <a14:hiddenFill xmlns="" xmlns:a14="http://schemas.microsoft.com/office/drawing/2010/main">
                 <a:solidFill>
                   <a:srgbClr val="FFFFFF"/>
                 </a:solidFill>
@@ -4332,10 +4376,54 @@
           </a:extLst>
         </p:spPr>
       </p:pic>
+      <p:sp>
+        <p:nvSpPr>
+          <p:cNvPr id="11" name="TextBox 10"/>
+          <p:cNvSpPr txBox="1"/>
+          <p:nvPr/>
+        </p:nvSpPr>
+        <p:spPr>
+          <a:xfrm>
+            <a:off x="6156176" y="620688"/>
+            <a:ext cx="1296144" cy="369332"/>
+          </a:xfrm>
+          <a:prstGeom prst="rect">
+            <a:avLst/>
+          </a:prstGeom>
+          <a:solidFill>
+            <a:srgbClr val="FF0000"/>
+          </a:solidFill>
+        </p:spPr>
+        <p:txBody>
+          <a:bodyPr wrap="square" rtlCol="0">
+            <a:spAutoFit/>
+          </a:bodyPr>
+          <a:lstStyle/>
+          <a:p>
+            <a:r>
+              <a:rPr lang="ko-KR" altLang="en-US" b="1" dirty="0" smtClean="0">
+                <a:solidFill>
+                  <a:schemeClr val="bg1">
+                    <a:lumMod val="95000"/>
+                  </a:schemeClr>
+                </a:solidFill>
+              </a:rPr>
+              <a:t>모델확인</a:t>
+            </a:r>
+            <a:endParaRPr lang="ko-KR" altLang="en-US" b="1" dirty="0">
+              <a:solidFill>
+                <a:schemeClr val="bg1">
+                  <a:lumMod val="95000"/>
+                </a:schemeClr>
+              </a:solidFill>
+            </a:endParaRPr>
+          </a:p>
+        </p:txBody>
+      </p:sp>
     </p:spTree>
     <p:extLst>
       <p:ext uri="{BB962C8B-B14F-4D97-AF65-F5344CB8AC3E}">
-        <p14:creationId xmlns:p14="http://schemas.microsoft.com/office/powerpoint/2010/main" xmlns="" val="1730050832"/>
+        <p14:creationId xmlns="" xmlns:p14="http://schemas.microsoft.com/office/powerpoint/2010/main" val="1730050832"/>
       </p:ext>
     </p:extLst>
   </p:cSld>
@@ -4823,14 +4911,14 @@
           <a:effectLst/>
           <a:extLst>
             <a:ext uri="{909E8E84-426E-40DD-AFC4-6F175D3DCCD1}">
-              <a14:hiddenFill xmlns:a14="http://schemas.microsoft.com/office/drawing/2010/main" xmlns="">
+              <a14:hiddenFill xmlns="" xmlns:a14="http://schemas.microsoft.com/office/drawing/2010/main">
                 <a:solidFill>
                   <a:schemeClr val="accent1"/>
                 </a:solidFill>
               </a14:hiddenFill>
             </a:ext>
             <a:ext uri="{91240B29-F687-4F45-9708-019B960494DF}">
-              <a14:hiddenLine xmlns:a14="http://schemas.microsoft.com/office/drawing/2010/main" xmlns="" w="9525">
+              <a14:hiddenLine xmlns="" xmlns:a14="http://schemas.microsoft.com/office/drawing/2010/main" w="9525">
                 <a:solidFill>
                   <a:schemeClr val="tx1"/>
                 </a:solidFill>
@@ -4840,7 +4928,7 @@
               </a14:hiddenLine>
             </a:ext>
             <a:ext uri="{AF507438-7753-43E0-B8FC-AC1667EBCBE1}">
-              <a14:hiddenEffects xmlns:a14="http://schemas.microsoft.com/office/drawing/2010/main" xmlns="">
+              <a14:hiddenEffects xmlns="" xmlns:a14="http://schemas.microsoft.com/office/drawing/2010/main">
                 <a:effectLst>
                   <a:outerShdw dist="35921" dir="2700000" algn="ctr" rotWithShape="0">
                     <a:schemeClr val="bg2"/>
@@ -4886,14 +4974,14 @@
           <a:effectLst/>
           <a:extLst>
             <a:ext uri="{909E8E84-426E-40DD-AFC4-6F175D3DCCD1}">
-              <a14:hiddenFill xmlns:a14="http://schemas.microsoft.com/office/drawing/2010/main" xmlns="">
+              <a14:hiddenFill xmlns="" xmlns:a14="http://schemas.microsoft.com/office/drawing/2010/main">
                 <a:solidFill>
                   <a:schemeClr val="accent1"/>
                 </a:solidFill>
               </a14:hiddenFill>
             </a:ext>
             <a:ext uri="{91240B29-F687-4F45-9708-019B960494DF}">
-              <a14:hiddenLine xmlns:a14="http://schemas.microsoft.com/office/drawing/2010/main" xmlns="" w="9525">
+              <a14:hiddenLine xmlns="" xmlns:a14="http://schemas.microsoft.com/office/drawing/2010/main" w="9525">
                 <a:solidFill>
                   <a:schemeClr val="tx1"/>
                 </a:solidFill>
@@ -4903,7 +4991,7 @@
               </a14:hiddenLine>
             </a:ext>
             <a:ext uri="{AF507438-7753-43E0-B8FC-AC1667EBCBE1}">
-              <a14:hiddenEffects xmlns:a14="http://schemas.microsoft.com/office/drawing/2010/main" xmlns="">
+              <a14:hiddenEffects xmlns="" xmlns:a14="http://schemas.microsoft.com/office/drawing/2010/main">
                 <a:effectLst>
                   <a:outerShdw dist="35921" dir="2700000" algn="ctr" rotWithShape="0">
                     <a:schemeClr val="bg2"/>
@@ -4949,14 +5037,14 @@
           <a:effectLst/>
           <a:extLst>
             <a:ext uri="{909E8E84-426E-40DD-AFC4-6F175D3DCCD1}">
-              <a14:hiddenFill xmlns:a14="http://schemas.microsoft.com/office/drawing/2010/main" xmlns="">
+              <a14:hiddenFill xmlns="" xmlns:a14="http://schemas.microsoft.com/office/drawing/2010/main">
                 <a:solidFill>
                   <a:schemeClr val="accent1"/>
                 </a:solidFill>
               </a14:hiddenFill>
             </a:ext>
             <a:ext uri="{91240B29-F687-4F45-9708-019B960494DF}">
-              <a14:hiddenLine xmlns:a14="http://schemas.microsoft.com/office/drawing/2010/main" xmlns="" w="9525">
+              <a14:hiddenLine xmlns="" xmlns:a14="http://schemas.microsoft.com/office/drawing/2010/main" w="9525">
                 <a:solidFill>
                   <a:schemeClr val="tx1"/>
                 </a:solidFill>
@@ -4966,7 +5054,7 @@
               </a14:hiddenLine>
             </a:ext>
             <a:ext uri="{AF507438-7753-43E0-B8FC-AC1667EBCBE1}">
-              <a14:hiddenEffects xmlns:a14="http://schemas.microsoft.com/office/drawing/2010/main" xmlns="">
+              <a14:hiddenEffects xmlns="" xmlns:a14="http://schemas.microsoft.com/office/drawing/2010/main">
                 <a:effectLst>
                   <a:outerShdw dist="35921" dir="2700000" algn="ctr" rotWithShape="0">
                     <a:schemeClr val="bg2"/>
@@ -5003,7 +5091,7 @@
           <a:blip r:embed="rId3" cstate="print">
             <a:extLst>
               <a:ext uri="{28A0092B-C50C-407E-A947-70E740481C1C}">
-                <a14:useLocalDpi xmlns:a14="http://schemas.microsoft.com/office/drawing/2010/main" xmlns="" val="0"/>
+                <a14:useLocalDpi xmlns="" xmlns:a14="http://schemas.microsoft.com/office/drawing/2010/main" val="0"/>
               </a:ext>
             </a:extLst>
           </a:blip>
@@ -5023,7 +5111,7 @@
           <a:noFill/>
           <a:extLst>
             <a:ext uri="{909E8E84-426E-40DD-AFC4-6F175D3DCCD1}">
-              <a14:hiddenFill xmlns:a14="http://schemas.microsoft.com/office/drawing/2010/main" xmlns="">
+              <a14:hiddenFill xmlns="" xmlns:a14="http://schemas.microsoft.com/office/drawing/2010/main">
                 <a:solidFill>
                   <a:srgbClr val="FFFFFF"/>
                 </a:solidFill>
@@ -5044,7 +5132,7 @@
           <a:blip r:embed="rId4" cstate="print">
             <a:extLst>
               <a:ext uri="{28A0092B-C50C-407E-A947-70E740481C1C}">
-                <a14:useLocalDpi xmlns:a14="http://schemas.microsoft.com/office/drawing/2010/main" xmlns="" val="0"/>
+                <a14:useLocalDpi xmlns="" xmlns:a14="http://schemas.microsoft.com/office/drawing/2010/main" val="0"/>
               </a:ext>
             </a:extLst>
           </a:blip>
@@ -5067,14 +5155,14 @@
           </a:ln>
           <a:extLst>
             <a:ext uri="{909E8E84-426E-40DD-AFC4-6F175D3DCCD1}">
-              <a14:hiddenFill xmlns:a14="http://schemas.microsoft.com/office/drawing/2010/main" xmlns="">
+              <a14:hiddenFill xmlns="" xmlns:a14="http://schemas.microsoft.com/office/drawing/2010/main">
                 <a:solidFill>
                   <a:schemeClr val="accent1"/>
                 </a:solidFill>
               </a14:hiddenFill>
             </a:ext>
             <a:ext uri="{91240B29-F687-4F45-9708-019B960494DF}">
-              <a14:hiddenLine xmlns:a14="http://schemas.microsoft.com/office/drawing/2010/main" xmlns="" w="9525">
+              <a14:hiddenLine xmlns="" xmlns:a14="http://schemas.microsoft.com/office/drawing/2010/main" w="9525">
                 <a:solidFill>
                   <a:schemeClr val="tx1"/>
                 </a:solidFill>
@@ -5153,7 +5241,7 @@
     </p:spTree>
     <p:extLst>
       <p:ext uri="{BB962C8B-B14F-4D97-AF65-F5344CB8AC3E}">
-        <p14:creationId xmlns:p14="http://schemas.microsoft.com/office/powerpoint/2010/main" xmlns="" val="2771864482"/>
+        <p14:creationId xmlns="" xmlns:p14="http://schemas.microsoft.com/office/powerpoint/2010/main" val="2771864482"/>
       </p:ext>
     </p:extLst>
   </p:cSld>
@@ -5560,14 +5648,14 @@
           <a:effectLst/>
           <a:extLst>
             <a:ext uri="{909E8E84-426E-40DD-AFC4-6F175D3DCCD1}">
-              <a14:hiddenFill xmlns:a14="http://schemas.microsoft.com/office/drawing/2010/main" xmlns="">
+              <a14:hiddenFill xmlns="" xmlns:a14="http://schemas.microsoft.com/office/drawing/2010/main">
                 <a:solidFill>
                   <a:schemeClr val="accent1"/>
                 </a:solidFill>
               </a14:hiddenFill>
             </a:ext>
             <a:ext uri="{91240B29-F687-4F45-9708-019B960494DF}">
-              <a14:hiddenLine xmlns:a14="http://schemas.microsoft.com/office/drawing/2010/main" xmlns="" w="9525">
+              <a14:hiddenLine xmlns="" xmlns:a14="http://schemas.microsoft.com/office/drawing/2010/main" w="9525">
                 <a:solidFill>
                   <a:schemeClr val="tx1"/>
                 </a:solidFill>
@@ -5577,7 +5665,7 @@
               </a14:hiddenLine>
             </a:ext>
             <a:ext uri="{AF507438-7753-43E0-B8FC-AC1667EBCBE1}">
-              <a14:hiddenEffects xmlns:a14="http://schemas.microsoft.com/office/drawing/2010/main" xmlns="">
+              <a14:hiddenEffects xmlns="" xmlns:a14="http://schemas.microsoft.com/office/drawing/2010/main">
                 <a:effectLst>
                   <a:outerShdw dist="35921" dir="2700000" algn="ctr" rotWithShape="0">
                     <a:schemeClr val="bg2"/>
@@ -5623,14 +5711,14 @@
           <a:effectLst/>
           <a:extLst>
             <a:ext uri="{909E8E84-426E-40DD-AFC4-6F175D3DCCD1}">
-              <a14:hiddenFill xmlns:a14="http://schemas.microsoft.com/office/drawing/2010/main" xmlns="">
+              <a14:hiddenFill xmlns="" xmlns:a14="http://schemas.microsoft.com/office/drawing/2010/main">
                 <a:solidFill>
                   <a:schemeClr val="accent1"/>
                 </a:solidFill>
               </a14:hiddenFill>
             </a:ext>
             <a:ext uri="{91240B29-F687-4F45-9708-019B960494DF}">
-              <a14:hiddenLine xmlns:a14="http://schemas.microsoft.com/office/drawing/2010/main" xmlns="" w="9525">
+              <a14:hiddenLine xmlns="" xmlns:a14="http://schemas.microsoft.com/office/drawing/2010/main" w="9525">
                 <a:solidFill>
                   <a:schemeClr val="tx1"/>
                 </a:solidFill>
@@ -5640,7 +5728,7 @@
               </a14:hiddenLine>
             </a:ext>
             <a:ext uri="{AF507438-7753-43E0-B8FC-AC1667EBCBE1}">
-              <a14:hiddenEffects xmlns:a14="http://schemas.microsoft.com/office/drawing/2010/main" xmlns="">
+              <a14:hiddenEffects xmlns="" xmlns:a14="http://schemas.microsoft.com/office/drawing/2010/main">
                 <a:effectLst>
                   <a:outerShdw dist="35921" dir="2700000" algn="ctr" rotWithShape="0">
                     <a:schemeClr val="bg2"/>
@@ -5686,14 +5774,14 @@
           <a:effectLst/>
           <a:extLst>
             <a:ext uri="{909E8E84-426E-40DD-AFC4-6F175D3DCCD1}">
-              <a14:hiddenFill xmlns:a14="http://schemas.microsoft.com/office/drawing/2010/main" xmlns="">
+              <a14:hiddenFill xmlns="" xmlns:a14="http://schemas.microsoft.com/office/drawing/2010/main">
                 <a:solidFill>
                   <a:schemeClr val="accent1"/>
                 </a:solidFill>
               </a14:hiddenFill>
             </a:ext>
             <a:ext uri="{91240B29-F687-4F45-9708-019B960494DF}">
-              <a14:hiddenLine xmlns:a14="http://schemas.microsoft.com/office/drawing/2010/main" xmlns="" w="9525">
+              <a14:hiddenLine xmlns="" xmlns:a14="http://schemas.microsoft.com/office/drawing/2010/main" w="9525">
                 <a:solidFill>
                   <a:schemeClr val="tx1"/>
                 </a:solidFill>
@@ -5703,7 +5791,7 @@
               </a14:hiddenLine>
             </a:ext>
             <a:ext uri="{AF507438-7753-43E0-B8FC-AC1667EBCBE1}">
-              <a14:hiddenEffects xmlns:a14="http://schemas.microsoft.com/office/drawing/2010/main" xmlns="">
+              <a14:hiddenEffects xmlns="" xmlns:a14="http://schemas.microsoft.com/office/drawing/2010/main">
                 <a:effectLst>
                   <a:outerShdw dist="35921" dir="2700000" algn="ctr" rotWithShape="0">
                     <a:schemeClr val="bg2"/>
@@ -5749,14 +5837,14 @@
           <a:effectLst/>
           <a:extLst>
             <a:ext uri="{909E8E84-426E-40DD-AFC4-6F175D3DCCD1}">
-              <a14:hiddenFill xmlns:a14="http://schemas.microsoft.com/office/drawing/2010/main" xmlns="">
+              <a14:hiddenFill xmlns="" xmlns:a14="http://schemas.microsoft.com/office/drawing/2010/main">
                 <a:solidFill>
                   <a:schemeClr val="accent1"/>
                 </a:solidFill>
               </a14:hiddenFill>
             </a:ext>
             <a:ext uri="{91240B29-F687-4F45-9708-019B960494DF}">
-              <a14:hiddenLine xmlns:a14="http://schemas.microsoft.com/office/drawing/2010/main" xmlns="" w="9525">
+              <a14:hiddenLine xmlns="" xmlns:a14="http://schemas.microsoft.com/office/drawing/2010/main" w="9525">
                 <a:solidFill>
                   <a:schemeClr val="tx1"/>
                 </a:solidFill>
@@ -5766,7 +5854,7 @@
               </a14:hiddenLine>
             </a:ext>
             <a:ext uri="{AF507438-7753-43E0-B8FC-AC1667EBCBE1}">
-              <a14:hiddenEffects xmlns:a14="http://schemas.microsoft.com/office/drawing/2010/main" xmlns="">
+              <a14:hiddenEffects xmlns="" xmlns:a14="http://schemas.microsoft.com/office/drawing/2010/main">
                 <a:effectLst>
                   <a:outerShdw dist="35921" dir="2700000" algn="ctr" rotWithShape="0">
                     <a:schemeClr val="bg2"/>
@@ -5801,7 +5889,7 @@
           <a:blip r:embed="rId2" cstate="print">
             <a:extLst>
               <a:ext uri="{28A0092B-C50C-407E-A947-70E740481C1C}">
-                <a14:useLocalDpi xmlns:a14="http://schemas.microsoft.com/office/drawing/2010/main" xmlns="" val="0"/>
+                <a14:useLocalDpi xmlns="" xmlns:a14="http://schemas.microsoft.com/office/drawing/2010/main" val="0"/>
               </a:ext>
             </a:extLst>
           </a:blip>
@@ -5824,14 +5912,14 @@
           </a:ln>
           <a:extLst>
             <a:ext uri="{909E8E84-426E-40DD-AFC4-6F175D3DCCD1}">
-              <a14:hiddenFill xmlns:a14="http://schemas.microsoft.com/office/drawing/2010/main" xmlns="">
+              <a14:hiddenFill xmlns="" xmlns:a14="http://schemas.microsoft.com/office/drawing/2010/main">
                 <a:solidFill>
                   <a:schemeClr val="accent1"/>
                 </a:solidFill>
               </a14:hiddenFill>
             </a:ext>
             <a:ext uri="{91240B29-F687-4F45-9708-019B960494DF}">
-              <a14:hiddenLine xmlns:a14="http://schemas.microsoft.com/office/drawing/2010/main" xmlns="" w="9525">
+              <a14:hiddenLine xmlns="" xmlns:a14="http://schemas.microsoft.com/office/drawing/2010/main" w="9525">
                 <a:solidFill>
                   <a:schemeClr val="tx1"/>
                 </a:solidFill>
@@ -5910,7 +5998,7 @@
     </p:spTree>
     <p:extLst>
       <p:ext uri="{BB962C8B-B14F-4D97-AF65-F5344CB8AC3E}">
-        <p14:creationId xmlns:p14="http://schemas.microsoft.com/office/powerpoint/2010/main" xmlns="" val="99905071"/>
+        <p14:creationId xmlns="" xmlns:p14="http://schemas.microsoft.com/office/powerpoint/2010/main" val="99905071"/>
       </p:ext>
     </p:extLst>
   </p:cSld>
@@ -6343,14 +6431,14 @@
           <a:effectLst/>
           <a:extLst>
             <a:ext uri="{909E8E84-426E-40DD-AFC4-6F175D3DCCD1}">
-              <a14:hiddenFill xmlns:a14="http://schemas.microsoft.com/office/drawing/2010/main" xmlns="">
+              <a14:hiddenFill xmlns="" xmlns:a14="http://schemas.microsoft.com/office/drawing/2010/main">
                 <a:solidFill>
                   <a:schemeClr val="accent1"/>
                 </a:solidFill>
               </a14:hiddenFill>
             </a:ext>
             <a:ext uri="{91240B29-F687-4F45-9708-019B960494DF}">
-              <a14:hiddenLine xmlns:a14="http://schemas.microsoft.com/office/drawing/2010/main" xmlns="" w="9525">
+              <a14:hiddenLine xmlns="" xmlns:a14="http://schemas.microsoft.com/office/drawing/2010/main" w="9525">
                 <a:solidFill>
                   <a:schemeClr val="tx1"/>
                 </a:solidFill>
@@ -6360,7 +6448,7 @@
               </a14:hiddenLine>
             </a:ext>
             <a:ext uri="{AF507438-7753-43E0-B8FC-AC1667EBCBE1}">
-              <a14:hiddenEffects xmlns:a14="http://schemas.microsoft.com/office/drawing/2010/main" xmlns="">
+              <a14:hiddenEffects xmlns="" xmlns:a14="http://schemas.microsoft.com/office/drawing/2010/main">
                 <a:effectLst>
                   <a:outerShdw dist="35921" dir="2700000" algn="ctr" rotWithShape="0">
                     <a:schemeClr val="bg2"/>
@@ -6406,14 +6494,14 @@
           <a:effectLst/>
           <a:extLst>
             <a:ext uri="{909E8E84-426E-40DD-AFC4-6F175D3DCCD1}">
-              <a14:hiddenFill xmlns:a14="http://schemas.microsoft.com/office/drawing/2010/main" xmlns="">
+              <a14:hiddenFill xmlns="" xmlns:a14="http://schemas.microsoft.com/office/drawing/2010/main">
                 <a:solidFill>
                   <a:schemeClr val="accent1"/>
                 </a:solidFill>
               </a14:hiddenFill>
             </a:ext>
             <a:ext uri="{91240B29-F687-4F45-9708-019B960494DF}">
-              <a14:hiddenLine xmlns:a14="http://schemas.microsoft.com/office/drawing/2010/main" xmlns="" w="9525">
+              <a14:hiddenLine xmlns="" xmlns:a14="http://schemas.microsoft.com/office/drawing/2010/main" w="9525">
                 <a:solidFill>
                   <a:schemeClr val="tx1"/>
                 </a:solidFill>
@@ -6423,7 +6511,7 @@
               </a14:hiddenLine>
             </a:ext>
             <a:ext uri="{AF507438-7753-43E0-B8FC-AC1667EBCBE1}">
-              <a14:hiddenEffects xmlns:a14="http://schemas.microsoft.com/office/drawing/2010/main" xmlns="">
+              <a14:hiddenEffects xmlns="" xmlns:a14="http://schemas.microsoft.com/office/drawing/2010/main">
                 <a:effectLst>
                   <a:outerShdw dist="35921" dir="2700000" algn="ctr" rotWithShape="0">
                     <a:schemeClr val="bg2"/>
@@ -6469,14 +6557,14 @@
           <a:effectLst/>
           <a:extLst>
             <a:ext uri="{909E8E84-426E-40DD-AFC4-6F175D3DCCD1}">
-              <a14:hiddenFill xmlns:a14="http://schemas.microsoft.com/office/drawing/2010/main" xmlns="">
+              <a14:hiddenFill xmlns="" xmlns:a14="http://schemas.microsoft.com/office/drawing/2010/main">
                 <a:solidFill>
                   <a:schemeClr val="accent1"/>
                 </a:solidFill>
               </a14:hiddenFill>
             </a:ext>
             <a:ext uri="{91240B29-F687-4F45-9708-019B960494DF}">
-              <a14:hiddenLine xmlns:a14="http://schemas.microsoft.com/office/drawing/2010/main" xmlns="" w="9525">
+              <a14:hiddenLine xmlns="" xmlns:a14="http://schemas.microsoft.com/office/drawing/2010/main" w="9525">
                 <a:solidFill>
                   <a:schemeClr val="tx1"/>
                 </a:solidFill>
@@ -6486,7 +6574,7 @@
               </a14:hiddenLine>
             </a:ext>
             <a:ext uri="{AF507438-7753-43E0-B8FC-AC1667EBCBE1}">
-              <a14:hiddenEffects xmlns:a14="http://schemas.microsoft.com/office/drawing/2010/main" xmlns="">
+              <a14:hiddenEffects xmlns="" xmlns:a14="http://schemas.microsoft.com/office/drawing/2010/main">
                 <a:effectLst>
                   <a:outerShdw dist="35921" dir="2700000" algn="ctr" rotWithShape="0">
                     <a:schemeClr val="bg2"/>
@@ -6532,14 +6620,14 @@
           <a:effectLst/>
           <a:extLst>
             <a:ext uri="{909E8E84-426E-40DD-AFC4-6F175D3DCCD1}">
-              <a14:hiddenFill xmlns:a14="http://schemas.microsoft.com/office/drawing/2010/main" xmlns="">
+              <a14:hiddenFill xmlns="" xmlns:a14="http://schemas.microsoft.com/office/drawing/2010/main">
                 <a:solidFill>
                   <a:schemeClr val="accent1"/>
                 </a:solidFill>
               </a14:hiddenFill>
             </a:ext>
             <a:ext uri="{91240B29-F687-4F45-9708-019B960494DF}">
-              <a14:hiddenLine xmlns:a14="http://schemas.microsoft.com/office/drawing/2010/main" xmlns="" w="9525">
+              <a14:hiddenLine xmlns="" xmlns:a14="http://schemas.microsoft.com/office/drawing/2010/main" w="9525">
                 <a:solidFill>
                   <a:schemeClr val="tx1"/>
                 </a:solidFill>
@@ -6549,7 +6637,7 @@
               </a14:hiddenLine>
             </a:ext>
             <a:ext uri="{AF507438-7753-43E0-B8FC-AC1667EBCBE1}">
-              <a14:hiddenEffects xmlns:a14="http://schemas.microsoft.com/office/drawing/2010/main" xmlns="">
+              <a14:hiddenEffects xmlns="" xmlns:a14="http://schemas.microsoft.com/office/drawing/2010/main">
                 <a:effectLst>
                   <a:outerShdw dist="35921" dir="2700000" algn="ctr" rotWithShape="0">
                     <a:schemeClr val="bg2"/>
@@ -6584,7 +6672,7 @@
           <a:blip r:embed="rId3" cstate="print">
             <a:extLst>
               <a:ext uri="{28A0092B-C50C-407E-A947-70E740481C1C}">
-                <a14:useLocalDpi xmlns:a14="http://schemas.microsoft.com/office/drawing/2010/main" xmlns="" val="0"/>
+                <a14:useLocalDpi xmlns="" xmlns:a14="http://schemas.microsoft.com/office/drawing/2010/main" val="0"/>
               </a:ext>
             </a:extLst>
           </a:blip>
@@ -6604,7 +6692,7 @@
           <a:noFill/>
           <a:extLst>
             <a:ext uri="{909E8E84-426E-40DD-AFC4-6F175D3DCCD1}">
-              <a14:hiddenFill xmlns:a14="http://schemas.microsoft.com/office/drawing/2010/main" xmlns="">
+              <a14:hiddenFill xmlns="" xmlns:a14="http://schemas.microsoft.com/office/drawing/2010/main">
                 <a:solidFill>
                   <a:srgbClr val="FFFFFF"/>
                 </a:solidFill>
@@ -6613,10 +6701,54 @@
           </a:extLst>
         </p:spPr>
       </p:pic>
+      <p:sp>
+        <p:nvSpPr>
+          <p:cNvPr id="9" name="TextBox 8"/>
+          <p:cNvSpPr txBox="1"/>
+          <p:nvPr/>
+        </p:nvSpPr>
+        <p:spPr>
+          <a:xfrm>
+            <a:off x="6156176" y="620688"/>
+            <a:ext cx="1296144" cy="369332"/>
+          </a:xfrm>
+          <a:prstGeom prst="rect">
+            <a:avLst/>
+          </a:prstGeom>
+          <a:solidFill>
+            <a:srgbClr val="FF0000"/>
+          </a:solidFill>
+        </p:spPr>
+        <p:txBody>
+          <a:bodyPr wrap="square" rtlCol="0">
+            <a:spAutoFit/>
+          </a:bodyPr>
+          <a:lstStyle/>
+          <a:p>
+            <a:r>
+              <a:rPr lang="ko-KR" altLang="en-US" b="1" dirty="0" smtClean="0">
+                <a:solidFill>
+                  <a:schemeClr val="bg1">
+                    <a:lumMod val="95000"/>
+                  </a:schemeClr>
+                </a:solidFill>
+              </a:rPr>
+              <a:t>모델확인</a:t>
+            </a:r>
+            <a:endParaRPr lang="ko-KR" altLang="en-US" b="1" dirty="0">
+              <a:solidFill>
+                <a:schemeClr val="bg1">
+                  <a:lumMod val="95000"/>
+                </a:schemeClr>
+              </a:solidFill>
+            </a:endParaRPr>
+          </a:p>
+        </p:txBody>
+      </p:sp>
     </p:spTree>
     <p:extLst>
       <p:ext uri="{BB962C8B-B14F-4D97-AF65-F5344CB8AC3E}">
-        <p14:creationId xmlns:p14="http://schemas.microsoft.com/office/powerpoint/2010/main" xmlns="" val="2964663350"/>
+        <p14:creationId xmlns="" xmlns:p14="http://schemas.microsoft.com/office/powerpoint/2010/main" val="2964663350"/>
       </p:ext>
     </p:extLst>
   </p:cSld>
@@ -7048,14 +7180,14 @@
           <a:effectLst/>
           <a:extLst>
             <a:ext uri="{909E8E84-426E-40DD-AFC4-6F175D3DCCD1}">
-              <a14:hiddenFill xmlns:a14="http://schemas.microsoft.com/office/drawing/2010/main" xmlns="">
+              <a14:hiddenFill xmlns="" xmlns:a14="http://schemas.microsoft.com/office/drawing/2010/main">
                 <a:solidFill>
                   <a:schemeClr val="accent1"/>
                 </a:solidFill>
               </a14:hiddenFill>
             </a:ext>
             <a:ext uri="{91240B29-F687-4F45-9708-019B960494DF}">
-              <a14:hiddenLine xmlns:a14="http://schemas.microsoft.com/office/drawing/2010/main" xmlns="" w="9525">
+              <a14:hiddenLine xmlns="" xmlns:a14="http://schemas.microsoft.com/office/drawing/2010/main" w="9525">
                 <a:solidFill>
                   <a:schemeClr val="tx1"/>
                 </a:solidFill>
@@ -7065,7 +7197,7 @@
               </a14:hiddenLine>
             </a:ext>
             <a:ext uri="{AF507438-7753-43E0-B8FC-AC1667EBCBE1}">
-              <a14:hiddenEffects xmlns:a14="http://schemas.microsoft.com/office/drawing/2010/main" xmlns="">
+              <a14:hiddenEffects xmlns="" xmlns:a14="http://schemas.microsoft.com/office/drawing/2010/main">
                 <a:effectLst>
                   <a:outerShdw dist="35921" dir="2700000" algn="ctr" rotWithShape="0">
                     <a:schemeClr val="bg2"/>
@@ -7100,7 +7232,7 @@
           <a:blip r:embed="rId3" cstate="print">
             <a:extLst>
               <a:ext uri="{28A0092B-C50C-407E-A947-70E740481C1C}">
-                <a14:useLocalDpi xmlns:a14="http://schemas.microsoft.com/office/drawing/2010/main" xmlns="" val="0"/>
+                <a14:useLocalDpi xmlns="" xmlns:a14="http://schemas.microsoft.com/office/drawing/2010/main" val="0"/>
               </a:ext>
             </a:extLst>
           </a:blip>
@@ -7120,7 +7252,7 @@
           <a:noFill/>
           <a:extLst>
             <a:ext uri="{909E8E84-426E-40DD-AFC4-6F175D3DCCD1}">
-              <a14:hiddenFill xmlns:a14="http://schemas.microsoft.com/office/drawing/2010/main" xmlns="">
+              <a14:hiddenFill xmlns="" xmlns:a14="http://schemas.microsoft.com/office/drawing/2010/main">
                 <a:solidFill>
                   <a:srgbClr val="FFFFFF"/>
                 </a:solidFill>
@@ -7141,7 +7273,7 @@
           <a:blip r:embed="rId4" cstate="print">
             <a:extLst>
               <a:ext uri="{28A0092B-C50C-407E-A947-70E740481C1C}">
-                <a14:useLocalDpi xmlns:a14="http://schemas.microsoft.com/office/drawing/2010/main" xmlns="" val="0"/>
+                <a14:useLocalDpi xmlns="" xmlns:a14="http://schemas.microsoft.com/office/drawing/2010/main" val="0"/>
               </a:ext>
             </a:extLst>
           </a:blip>
@@ -7161,7 +7293,7 @@
           <a:noFill/>
           <a:extLst>
             <a:ext uri="{909E8E84-426E-40DD-AFC4-6F175D3DCCD1}">
-              <a14:hiddenFill xmlns:a14="http://schemas.microsoft.com/office/drawing/2010/main" xmlns="">
+              <a14:hiddenFill xmlns="" xmlns:a14="http://schemas.microsoft.com/office/drawing/2010/main">
                 <a:solidFill>
                   <a:srgbClr val="FFFFFF"/>
                 </a:solidFill>
@@ -7182,7 +7314,7 @@
           <a:blip r:embed="rId5" cstate="print">
             <a:extLst>
               <a:ext uri="{28A0092B-C50C-407E-A947-70E740481C1C}">
-                <a14:useLocalDpi xmlns:a14="http://schemas.microsoft.com/office/drawing/2010/main" xmlns="" val="0"/>
+                <a14:useLocalDpi xmlns="" xmlns:a14="http://schemas.microsoft.com/office/drawing/2010/main" val="0"/>
               </a:ext>
             </a:extLst>
           </a:blip>
@@ -7202,7 +7334,7 @@
           <a:noFill/>
           <a:extLst>
             <a:ext uri="{909E8E84-426E-40DD-AFC4-6F175D3DCCD1}">
-              <a14:hiddenFill xmlns:a14="http://schemas.microsoft.com/office/drawing/2010/main" xmlns="">
+              <a14:hiddenFill xmlns="" xmlns:a14="http://schemas.microsoft.com/office/drawing/2010/main">
                 <a:solidFill>
                   <a:srgbClr val="FFFFFF"/>
                 </a:solidFill>
@@ -7223,7 +7355,7 @@
           <a:blip r:embed="rId6" cstate="print">
             <a:extLst>
               <a:ext uri="{28A0092B-C50C-407E-A947-70E740481C1C}">
-                <a14:useLocalDpi xmlns:a14="http://schemas.microsoft.com/office/drawing/2010/main" xmlns="" val="0"/>
+                <a14:useLocalDpi xmlns="" xmlns:a14="http://schemas.microsoft.com/office/drawing/2010/main" val="0"/>
               </a:ext>
             </a:extLst>
           </a:blip>
@@ -7243,7 +7375,7 @@
           <a:noFill/>
           <a:extLst>
             <a:ext uri="{909E8E84-426E-40DD-AFC4-6F175D3DCCD1}">
-              <a14:hiddenFill xmlns:a14="http://schemas.microsoft.com/office/drawing/2010/main" xmlns="">
+              <a14:hiddenFill xmlns="" xmlns:a14="http://schemas.microsoft.com/office/drawing/2010/main">
                 <a:solidFill>
                   <a:srgbClr val="FFFFFF"/>
                 </a:solidFill>
@@ -7275,14 +7407,14 @@
           <a:effectLst/>
           <a:extLst>
             <a:ext uri="{909E8E84-426E-40DD-AFC4-6F175D3DCCD1}">
-              <a14:hiddenFill xmlns:a14="http://schemas.microsoft.com/office/drawing/2010/main" xmlns="">
+              <a14:hiddenFill xmlns="" xmlns:a14="http://schemas.microsoft.com/office/drawing/2010/main">
                 <a:solidFill>
                   <a:schemeClr val="accent1"/>
                 </a:solidFill>
               </a14:hiddenFill>
             </a:ext>
             <a:ext uri="{91240B29-F687-4F45-9708-019B960494DF}">
-              <a14:hiddenLine xmlns:a14="http://schemas.microsoft.com/office/drawing/2010/main" xmlns="" w="9525">
+              <a14:hiddenLine xmlns="" xmlns:a14="http://schemas.microsoft.com/office/drawing/2010/main" w="9525">
                 <a:solidFill>
                   <a:schemeClr val="tx1"/>
                 </a:solidFill>
@@ -7292,7 +7424,7 @@
               </a14:hiddenLine>
             </a:ext>
             <a:ext uri="{AF507438-7753-43E0-B8FC-AC1667EBCBE1}">
-              <a14:hiddenEffects xmlns:a14="http://schemas.microsoft.com/office/drawing/2010/main" xmlns="">
+              <a14:hiddenEffects xmlns="" xmlns:a14="http://schemas.microsoft.com/office/drawing/2010/main">
                 <a:effectLst>
                   <a:outerShdw dist="35921" dir="2700000" algn="ctr" rotWithShape="0">
                     <a:schemeClr val="bg2"/>
@@ -7315,10 +7447,54 @@
           </a:p>
         </p:txBody>
       </p:sp>
+      <p:sp>
+        <p:nvSpPr>
+          <p:cNvPr id="10" name="TextBox 9"/>
+          <p:cNvSpPr txBox="1"/>
+          <p:nvPr/>
+        </p:nvSpPr>
+        <p:spPr>
+          <a:xfrm>
+            <a:off x="6156176" y="620688"/>
+            <a:ext cx="1296144" cy="369332"/>
+          </a:xfrm>
+          <a:prstGeom prst="rect">
+            <a:avLst/>
+          </a:prstGeom>
+          <a:solidFill>
+            <a:srgbClr val="FF0000"/>
+          </a:solidFill>
+        </p:spPr>
+        <p:txBody>
+          <a:bodyPr wrap="square" rtlCol="0">
+            <a:spAutoFit/>
+          </a:bodyPr>
+          <a:lstStyle/>
+          <a:p>
+            <a:r>
+              <a:rPr lang="ko-KR" altLang="en-US" b="1" dirty="0" smtClean="0">
+                <a:solidFill>
+                  <a:schemeClr val="bg1">
+                    <a:lumMod val="95000"/>
+                  </a:schemeClr>
+                </a:solidFill>
+              </a:rPr>
+              <a:t>모델확인</a:t>
+            </a:r>
+            <a:endParaRPr lang="ko-KR" altLang="en-US" b="1" dirty="0">
+              <a:solidFill>
+                <a:schemeClr val="bg1">
+                  <a:lumMod val="95000"/>
+                </a:schemeClr>
+              </a:solidFill>
+            </a:endParaRPr>
+          </a:p>
+        </p:txBody>
+      </p:sp>
     </p:spTree>
     <p:extLst>
       <p:ext uri="{BB962C8B-B14F-4D97-AF65-F5344CB8AC3E}">
-        <p14:creationId xmlns:p14="http://schemas.microsoft.com/office/powerpoint/2010/main" xmlns="" val="3459218166"/>
+        <p14:creationId xmlns="" xmlns:p14="http://schemas.microsoft.com/office/powerpoint/2010/main" val="3459218166"/>
       </p:ext>
     </p:extLst>
   </p:cSld>
@@ -7782,14 +7958,14 @@
           <a:effectLst/>
           <a:extLst>
             <a:ext uri="{909E8E84-426E-40DD-AFC4-6F175D3DCCD1}">
-              <a14:hiddenFill xmlns:a14="http://schemas.microsoft.com/office/drawing/2010/main" xmlns="">
+              <a14:hiddenFill xmlns="" xmlns:a14="http://schemas.microsoft.com/office/drawing/2010/main">
                 <a:solidFill>
                   <a:schemeClr val="accent1"/>
                 </a:solidFill>
               </a14:hiddenFill>
             </a:ext>
             <a:ext uri="{91240B29-F687-4F45-9708-019B960494DF}">
-              <a14:hiddenLine xmlns:a14="http://schemas.microsoft.com/office/drawing/2010/main" xmlns="" w="9525">
+              <a14:hiddenLine xmlns="" xmlns:a14="http://schemas.microsoft.com/office/drawing/2010/main" w="9525">
                 <a:solidFill>
                   <a:schemeClr val="tx1"/>
                 </a:solidFill>
@@ -7799,7 +7975,7 @@
               </a14:hiddenLine>
             </a:ext>
             <a:ext uri="{AF507438-7753-43E0-B8FC-AC1667EBCBE1}">
-              <a14:hiddenEffects xmlns:a14="http://schemas.microsoft.com/office/drawing/2010/main" xmlns="">
+              <a14:hiddenEffects xmlns="" xmlns:a14="http://schemas.microsoft.com/office/drawing/2010/main">
                 <a:effectLst>
                   <a:outerShdw dist="35921" dir="2700000" algn="ctr" rotWithShape="0">
                     <a:schemeClr val="bg2"/>
@@ -7845,14 +8021,14 @@
           <a:effectLst/>
           <a:extLst>
             <a:ext uri="{909E8E84-426E-40DD-AFC4-6F175D3DCCD1}">
-              <a14:hiddenFill xmlns:a14="http://schemas.microsoft.com/office/drawing/2010/main" xmlns="">
+              <a14:hiddenFill xmlns="" xmlns:a14="http://schemas.microsoft.com/office/drawing/2010/main">
                 <a:solidFill>
                   <a:schemeClr val="accent1"/>
                 </a:solidFill>
               </a14:hiddenFill>
             </a:ext>
             <a:ext uri="{91240B29-F687-4F45-9708-019B960494DF}">
-              <a14:hiddenLine xmlns:a14="http://schemas.microsoft.com/office/drawing/2010/main" xmlns="" w="9525">
+              <a14:hiddenLine xmlns="" xmlns:a14="http://schemas.microsoft.com/office/drawing/2010/main" w="9525">
                 <a:solidFill>
                   <a:schemeClr val="tx1"/>
                 </a:solidFill>
@@ -7862,7 +8038,7 @@
               </a14:hiddenLine>
             </a:ext>
             <a:ext uri="{AF507438-7753-43E0-B8FC-AC1667EBCBE1}">
-              <a14:hiddenEffects xmlns:a14="http://schemas.microsoft.com/office/drawing/2010/main" xmlns="">
+              <a14:hiddenEffects xmlns="" xmlns:a14="http://schemas.microsoft.com/office/drawing/2010/main">
                 <a:effectLst>
                   <a:outerShdw dist="35921" dir="2700000" algn="ctr" rotWithShape="0">
                     <a:schemeClr val="bg2"/>
@@ -7908,14 +8084,14 @@
           <a:effectLst/>
           <a:extLst>
             <a:ext uri="{909E8E84-426E-40DD-AFC4-6F175D3DCCD1}">
-              <a14:hiddenFill xmlns:a14="http://schemas.microsoft.com/office/drawing/2010/main" xmlns="">
+              <a14:hiddenFill xmlns="" xmlns:a14="http://schemas.microsoft.com/office/drawing/2010/main">
                 <a:solidFill>
                   <a:schemeClr val="accent1"/>
                 </a:solidFill>
               </a14:hiddenFill>
             </a:ext>
             <a:ext uri="{91240B29-F687-4F45-9708-019B960494DF}">
-              <a14:hiddenLine xmlns:a14="http://schemas.microsoft.com/office/drawing/2010/main" xmlns="" w="9525">
+              <a14:hiddenLine xmlns="" xmlns:a14="http://schemas.microsoft.com/office/drawing/2010/main" w="9525">
                 <a:solidFill>
                   <a:schemeClr val="tx1"/>
                 </a:solidFill>
@@ -7925,7 +8101,7 @@
               </a14:hiddenLine>
             </a:ext>
             <a:ext uri="{AF507438-7753-43E0-B8FC-AC1667EBCBE1}">
-              <a14:hiddenEffects xmlns:a14="http://schemas.microsoft.com/office/drawing/2010/main" xmlns="">
+              <a14:hiddenEffects xmlns="" xmlns:a14="http://schemas.microsoft.com/office/drawing/2010/main">
                 <a:effectLst>
                   <a:outerShdw dist="35921" dir="2700000" algn="ctr" rotWithShape="0">
                     <a:schemeClr val="bg2"/>
@@ -7960,7 +8136,7 @@
           <a:blip r:embed="rId3" cstate="print">
             <a:extLst>
               <a:ext uri="{28A0092B-C50C-407E-A947-70E740481C1C}">
-                <a14:useLocalDpi xmlns:a14="http://schemas.microsoft.com/office/drawing/2010/main" xmlns="" val="0"/>
+                <a14:useLocalDpi xmlns="" xmlns:a14="http://schemas.microsoft.com/office/drawing/2010/main" val="0"/>
               </a:ext>
             </a:extLst>
           </a:blip>
@@ -7980,7 +8156,7 @@
           <a:noFill/>
           <a:extLst>
             <a:ext uri="{909E8E84-426E-40DD-AFC4-6F175D3DCCD1}">
-              <a14:hiddenFill xmlns:a14="http://schemas.microsoft.com/office/drawing/2010/main" xmlns="">
+              <a14:hiddenFill xmlns="" xmlns:a14="http://schemas.microsoft.com/office/drawing/2010/main">
                 <a:solidFill>
                   <a:srgbClr val="FFFFFF"/>
                 </a:solidFill>
@@ -8001,7 +8177,7 @@
           <a:blip r:embed="rId4" cstate="print">
             <a:extLst>
               <a:ext uri="{28A0092B-C50C-407E-A947-70E740481C1C}">
-                <a14:useLocalDpi xmlns:a14="http://schemas.microsoft.com/office/drawing/2010/main" xmlns="" val="0"/>
+                <a14:useLocalDpi xmlns="" xmlns:a14="http://schemas.microsoft.com/office/drawing/2010/main" val="0"/>
               </a:ext>
             </a:extLst>
           </a:blip>
@@ -8021,7 +8197,7 @@
           <a:noFill/>
           <a:extLst>
             <a:ext uri="{909E8E84-426E-40DD-AFC4-6F175D3DCCD1}">
-              <a14:hiddenFill xmlns:a14="http://schemas.microsoft.com/office/drawing/2010/main" xmlns="">
+              <a14:hiddenFill xmlns="" xmlns:a14="http://schemas.microsoft.com/office/drawing/2010/main">
                 <a:solidFill>
                   <a:srgbClr val="FFFFFF"/>
                 </a:solidFill>
@@ -8042,7 +8218,7 @@
           <a:blip r:embed="rId5" cstate="print">
             <a:extLst>
               <a:ext uri="{28A0092B-C50C-407E-A947-70E740481C1C}">
-                <a14:useLocalDpi xmlns:a14="http://schemas.microsoft.com/office/drawing/2010/main" xmlns="" val="0"/>
+                <a14:useLocalDpi xmlns="" xmlns:a14="http://schemas.microsoft.com/office/drawing/2010/main" val="0"/>
               </a:ext>
             </a:extLst>
           </a:blip>
@@ -8062,7 +8238,7 @@
           <a:noFill/>
           <a:extLst>
             <a:ext uri="{909E8E84-426E-40DD-AFC4-6F175D3DCCD1}">
-              <a14:hiddenFill xmlns:a14="http://schemas.microsoft.com/office/drawing/2010/main" xmlns="">
+              <a14:hiddenFill xmlns="" xmlns:a14="http://schemas.microsoft.com/office/drawing/2010/main">
                 <a:solidFill>
                   <a:srgbClr val="FFFFFF"/>
                 </a:solidFill>
@@ -8083,7 +8259,7 @@
           <a:blip r:embed="rId6" cstate="print">
             <a:extLst>
               <a:ext uri="{28A0092B-C50C-407E-A947-70E740481C1C}">
-                <a14:useLocalDpi xmlns:a14="http://schemas.microsoft.com/office/drawing/2010/main" xmlns="" val="0"/>
+                <a14:useLocalDpi xmlns="" xmlns:a14="http://schemas.microsoft.com/office/drawing/2010/main" val="0"/>
               </a:ext>
             </a:extLst>
           </a:blip>
@@ -8103,7 +8279,7 @@
           <a:noFill/>
           <a:extLst>
             <a:ext uri="{909E8E84-426E-40DD-AFC4-6F175D3DCCD1}">
-              <a14:hiddenFill xmlns:a14="http://schemas.microsoft.com/office/drawing/2010/main" xmlns="">
+              <a14:hiddenFill xmlns="" xmlns:a14="http://schemas.microsoft.com/office/drawing/2010/main">
                 <a:solidFill>
                   <a:srgbClr val="FFFFFF"/>
                 </a:solidFill>
@@ -8135,14 +8311,14 @@
           <a:effectLst/>
           <a:extLst>
             <a:ext uri="{909E8E84-426E-40DD-AFC4-6F175D3DCCD1}">
-              <a14:hiddenFill xmlns:a14="http://schemas.microsoft.com/office/drawing/2010/main" xmlns="">
+              <a14:hiddenFill xmlns="" xmlns:a14="http://schemas.microsoft.com/office/drawing/2010/main">
                 <a:solidFill>
                   <a:schemeClr val="accent1"/>
                 </a:solidFill>
               </a14:hiddenFill>
             </a:ext>
             <a:ext uri="{91240B29-F687-4F45-9708-019B960494DF}">
-              <a14:hiddenLine xmlns:a14="http://schemas.microsoft.com/office/drawing/2010/main" xmlns="" w="9525">
+              <a14:hiddenLine xmlns="" xmlns:a14="http://schemas.microsoft.com/office/drawing/2010/main" w="9525">
                 <a:solidFill>
                   <a:schemeClr val="tx1"/>
                 </a:solidFill>
@@ -8152,7 +8328,7 @@
               </a14:hiddenLine>
             </a:ext>
             <a:ext uri="{AF507438-7753-43E0-B8FC-AC1667EBCBE1}">
-              <a14:hiddenEffects xmlns:a14="http://schemas.microsoft.com/office/drawing/2010/main" xmlns="">
+              <a14:hiddenEffects xmlns="" xmlns:a14="http://schemas.microsoft.com/office/drawing/2010/main">
                 <a:effectLst>
                   <a:outerShdw dist="35921" dir="2700000" algn="ctr" rotWithShape="0">
                     <a:schemeClr val="bg2"/>
@@ -8178,7 +8354,7 @@
     </p:spTree>
     <p:extLst>
       <p:ext uri="{BB962C8B-B14F-4D97-AF65-F5344CB8AC3E}">
-        <p14:creationId xmlns:p14="http://schemas.microsoft.com/office/powerpoint/2010/main" xmlns="" val="4235693629"/>
+        <p14:creationId xmlns="" xmlns:p14="http://schemas.microsoft.com/office/powerpoint/2010/main" val="4235693629"/>
       </p:ext>
     </p:extLst>
   </p:cSld>
@@ -8609,7 +8785,7 @@
           <a:blip r:embed="rId3" cstate="print">
             <a:extLst>
               <a:ext uri="{28A0092B-C50C-407E-A947-70E740481C1C}">
-                <a14:useLocalDpi xmlns:a14="http://schemas.microsoft.com/office/drawing/2010/main" xmlns="" val="0"/>
+                <a14:useLocalDpi xmlns="" xmlns:a14="http://schemas.microsoft.com/office/drawing/2010/main" val="0"/>
               </a:ext>
             </a:extLst>
           </a:blip>
@@ -8629,7 +8805,7 @@
           <a:noFill/>
           <a:extLst>
             <a:ext uri="{909E8E84-426E-40DD-AFC4-6F175D3DCCD1}">
-              <a14:hiddenFill xmlns:a14="http://schemas.microsoft.com/office/drawing/2010/main" xmlns="">
+              <a14:hiddenFill xmlns="" xmlns:a14="http://schemas.microsoft.com/office/drawing/2010/main">
                 <a:solidFill>
                   <a:srgbClr val="FFFFFF"/>
                 </a:solidFill>
@@ -8650,7 +8826,7 @@
           <a:blip r:embed="rId4" cstate="print">
             <a:extLst>
               <a:ext uri="{28A0092B-C50C-407E-A947-70E740481C1C}">
-                <a14:useLocalDpi xmlns:a14="http://schemas.microsoft.com/office/drawing/2010/main" xmlns="" val="0"/>
+                <a14:useLocalDpi xmlns="" xmlns:a14="http://schemas.microsoft.com/office/drawing/2010/main" val="0"/>
               </a:ext>
             </a:extLst>
           </a:blip>
@@ -8670,7 +8846,7 @@
           <a:noFill/>
           <a:extLst>
             <a:ext uri="{909E8E84-426E-40DD-AFC4-6F175D3DCCD1}">
-              <a14:hiddenFill xmlns:a14="http://schemas.microsoft.com/office/drawing/2010/main" xmlns="">
+              <a14:hiddenFill xmlns="" xmlns:a14="http://schemas.microsoft.com/office/drawing/2010/main">
                 <a:solidFill>
                   <a:srgbClr val="FFFFFF"/>
                 </a:solidFill>
@@ -8691,7 +8867,7 @@
           <a:blip r:embed="rId5" cstate="print">
             <a:extLst>
               <a:ext uri="{28A0092B-C50C-407E-A947-70E740481C1C}">
-                <a14:useLocalDpi xmlns:a14="http://schemas.microsoft.com/office/drawing/2010/main" xmlns="" val="0"/>
+                <a14:useLocalDpi xmlns="" xmlns:a14="http://schemas.microsoft.com/office/drawing/2010/main" val="0"/>
               </a:ext>
             </a:extLst>
           </a:blip>
@@ -8711,7 +8887,7 @@
           <a:noFill/>
           <a:extLst>
             <a:ext uri="{909E8E84-426E-40DD-AFC4-6F175D3DCCD1}">
-              <a14:hiddenFill xmlns:a14="http://schemas.microsoft.com/office/drawing/2010/main" xmlns="">
+              <a14:hiddenFill xmlns="" xmlns:a14="http://schemas.microsoft.com/office/drawing/2010/main">
                 <a:solidFill>
                   <a:srgbClr val="FFFFFF"/>
                 </a:solidFill>
@@ -8732,7 +8908,7 @@
           <a:blip r:embed="rId6" cstate="print">
             <a:extLst>
               <a:ext uri="{28A0092B-C50C-407E-A947-70E740481C1C}">
-                <a14:useLocalDpi xmlns:a14="http://schemas.microsoft.com/office/drawing/2010/main" xmlns="" val="0"/>
+                <a14:useLocalDpi xmlns="" xmlns:a14="http://schemas.microsoft.com/office/drawing/2010/main" val="0"/>
               </a:ext>
             </a:extLst>
           </a:blip>
@@ -8752,7 +8928,7 @@
           <a:noFill/>
           <a:extLst>
             <a:ext uri="{909E8E84-426E-40DD-AFC4-6F175D3DCCD1}">
-              <a14:hiddenFill xmlns:a14="http://schemas.microsoft.com/office/drawing/2010/main" xmlns="">
+              <a14:hiddenFill xmlns="" xmlns:a14="http://schemas.microsoft.com/office/drawing/2010/main">
                 <a:solidFill>
                   <a:srgbClr val="FFFFFF"/>
                 </a:solidFill>
@@ -8784,14 +8960,14 @@
           <a:effectLst/>
           <a:extLst>
             <a:ext uri="{909E8E84-426E-40DD-AFC4-6F175D3DCCD1}">
-              <a14:hiddenFill xmlns:a14="http://schemas.microsoft.com/office/drawing/2010/main" xmlns="">
+              <a14:hiddenFill xmlns="" xmlns:a14="http://schemas.microsoft.com/office/drawing/2010/main">
                 <a:solidFill>
                   <a:schemeClr val="accent1"/>
                 </a:solidFill>
               </a14:hiddenFill>
             </a:ext>
             <a:ext uri="{91240B29-F687-4F45-9708-019B960494DF}">
-              <a14:hiddenLine xmlns:a14="http://schemas.microsoft.com/office/drawing/2010/main" xmlns="" w="9525">
+              <a14:hiddenLine xmlns="" xmlns:a14="http://schemas.microsoft.com/office/drawing/2010/main" w="9525">
                 <a:solidFill>
                   <a:schemeClr val="tx1"/>
                 </a:solidFill>
@@ -8801,7 +8977,7 @@
               </a14:hiddenLine>
             </a:ext>
             <a:ext uri="{AF507438-7753-43E0-B8FC-AC1667EBCBE1}">
-              <a14:hiddenEffects xmlns:a14="http://schemas.microsoft.com/office/drawing/2010/main" xmlns="">
+              <a14:hiddenEffects xmlns="" xmlns:a14="http://schemas.microsoft.com/office/drawing/2010/main">
                 <a:effectLst>
                   <a:outerShdw dist="35921" dir="2700000" algn="ctr" rotWithShape="0">
                     <a:schemeClr val="bg2"/>
@@ -8824,10 +9000,54 @@
           </a:p>
         </p:txBody>
       </p:sp>
+      <p:sp>
+        <p:nvSpPr>
+          <p:cNvPr id="9" name="TextBox 8"/>
+          <p:cNvSpPr txBox="1"/>
+          <p:nvPr/>
+        </p:nvSpPr>
+        <p:spPr>
+          <a:xfrm>
+            <a:off x="6156176" y="620688"/>
+            <a:ext cx="1296144" cy="369332"/>
+          </a:xfrm>
+          <a:prstGeom prst="rect">
+            <a:avLst/>
+          </a:prstGeom>
+          <a:solidFill>
+            <a:srgbClr val="FF0000"/>
+          </a:solidFill>
+        </p:spPr>
+        <p:txBody>
+          <a:bodyPr wrap="square" rtlCol="0">
+            <a:spAutoFit/>
+          </a:bodyPr>
+          <a:lstStyle/>
+          <a:p>
+            <a:r>
+              <a:rPr lang="ko-KR" altLang="en-US" b="1" dirty="0" smtClean="0">
+                <a:solidFill>
+                  <a:schemeClr val="bg1">
+                    <a:lumMod val="95000"/>
+                  </a:schemeClr>
+                </a:solidFill>
+              </a:rPr>
+              <a:t>모델확인</a:t>
+            </a:r>
+            <a:endParaRPr lang="ko-KR" altLang="en-US" b="1" dirty="0">
+              <a:solidFill>
+                <a:schemeClr val="bg1">
+                  <a:lumMod val="95000"/>
+                </a:schemeClr>
+              </a:solidFill>
+            </a:endParaRPr>
+          </a:p>
+        </p:txBody>
+      </p:sp>
     </p:spTree>
     <p:extLst>
       <p:ext uri="{BB962C8B-B14F-4D97-AF65-F5344CB8AC3E}">
-        <p14:creationId xmlns:p14="http://schemas.microsoft.com/office/powerpoint/2010/main" xmlns="" val="3638321484"/>
+        <p14:creationId xmlns="" xmlns:p14="http://schemas.microsoft.com/office/powerpoint/2010/main" val="3638321484"/>
       </p:ext>
     </p:extLst>
   </p:cSld>
@@ -9296,14 +9516,14 @@
           <a:effectLst/>
           <a:extLst>
             <a:ext uri="{909E8E84-426E-40DD-AFC4-6F175D3DCCD1}">
-              <a14:hiddenFill xmlns:a14="http://schemas.microsoft.com/office/drawing/2010/main" xmlns="">
+              <a14:hiddenFill xmlns="" xmlns:a14="http://schemas.microsoft.com/office/drawing/2010/main">
                 <a:solidFill>
                   <a:schemeClr val="accent1"/>
                 </a:solidFill>
               </a14:hiddenFill>
             </a:ext>
             <a:ext uri="{91240B29-F687-4F45-9708-019B960494DF}">
-              <a14:hiddenLine xmlns:a14="http://schemas.microsoft.com/office/drawing/2010/main" xmlns="" w="9525">
+              <a14:hiddenLine xmlns="" xmlns:a14="http://schemas.microsoft.com/office/drawing/2010/main" w="9525">
                 <a:solidFill>
                   <a:schemeClr val="tx1"/>
                 </a:solidFill>
@@ -9313,7 +9533,7 @@
               </a14:hiddenLine>
             </a:ext>
             <a:ext uri="{AF507438-7753-43E0-B8FC-AC1667EBCBE1}">
-              <a14:hiddenEffects xmlns:a14="http://schemas.microsoft.com/office/drawing/2010/main" xmlns="">
+              <a14:hiddenEffects xmlns="" xmlns:a14="http://schemas.microsoft.com/office/drawing/2010/main">
                 <a:effectLst>
                   <a:outerShdw dist="35921" dir="2700000" algn="ctr" rotWithShape="0">
                     <a:schemeClr val="bg2"/>
@@ -9359,14 +9579,14 @@
           <a:effectLst/>
           <a:extLst>
             <a:ext uri="{909E8E84-426E-40DD-AFC4-6F175D3DCCD1}">
-              <a14:hiddenFill xmlns:a14="http://schemas.microsoft.com/office/drawing/2010/main" xmlns="">
+              <a14:hiddenFill xmlns="" xmlns:a14="http://schemas.microsoft.com/office/drawing/2010/main">
                 <a:solidFill>
                   <a:schemeClr val="accent1"/>
                 </a:solidFill>
               </a14:hiddenFill>
             </a:ext>
             <a:ext uri="{91240B29-F687-4F45-9708-019B960494DF}">
-              <a14:hiddenLine xmlns:a14="http://schemas.microsoft.com/office/drawing/2010/main" xmlns="" w="9525">
+              <a14:hiddenLine xmlns="" xmlns:a14="http://schemas.microsoft.com/office/drawing/2010/main" w="9525">
                 <a:solidFill>
                   <a:schemeClr val="tx1"/>
                 </a:solidFill>
@@ -9376,7 +9596,7 @@
               </a14:hiddenLine>
             </a:ext>
             <a:ext uri="{AF507438-7753-43E0-B8FC-AC1667EBCBE1}">
-              <a14:hiddenEffects xmlns:a14="http://schemas.microsoft.com/office/drawing/2010/main" xmlns="">
+              <a14:hiddenEffects xmlns="" xmlns:a14="http://schemas.microsoft.com/office/drawing/2010/main">
                 <a:effectLst>
                   <a:outerShdw dist="35921" dir="2700000" algn="ctr" rotWithShape="0">
                     <a:schemeClr val="bg2"/>
@@ -9411,7 +9631,7 @@
           <a:blip r:embed="rId2" cstate="print">
             <a:extLst>
               <a:ext uri="{28A0092B-C50C-407E-A947-70E740481C1C}">
-                <a14:useLocalDpi xmlns:a14="http://schemas.microsoft.com/office/drawing/2010/main" xmlns="" val="0"/>
+                <a14:useLocalDpi xmlns="" xmlns:a14="http://schemas.microsoft.com/office/drawing/2010/main" val="0"/>
               </a:ext>
             </a:extLst>
           </a:blip>
@@ -9431,7 +9651,7 @@
           <a:noFill/>
           <a:extLst>
             <a:ext uri="{909E8E84-426E-40DD-AFC4-6F175D3DCCD1}">
-              <a14:hiddenFill xmlns:a14="http://schemas.microsoft.com/office/drawing/2010/main" xmlns="">
+              <a14:hiddenFill xmlns="" xmlns:a14="http://schemas.microsoft.com/office/drawing/2010/main">
                 <a:solidFill>
                   <a:srgbClr val="FFFFFF"/>
                 </a:solidFill>
@@ -9452,7 +9672,7 @@
           <a:blip r:embed="rId3" cstate="print">
             <a:extLst>
               <a:ext uri="{28A0092B-C50C-407E-A947-70E740481C1C}">
-                <a14:useLocalDpi xmlns:a14="http://schemas.microsoft.com/office/drawing/2010/main" xmlns="" val="0"/>
+                <a14:useLocalDpi xmlns="" xmlns:a14="http://schemas.microsoft.com/office/drawing/2010/main" val="0"/>
               </a:ext>
             </a:extLst>
           </a:blip>
@@ -9472,7 +9692,7 @@
           <a:noFill/>
           <a:extLst>
             <a:ext uri="{909E8E84-426E-40DD-AFC4-6F175D3DCCD1}">
-              <a14:hiddenFill xmlns:a14="http://schemas.microsoft.com/office/drawing/2010/main" xmlns="">
+              <a14:hiddenFill xmlns="" xmlns:a14="http://schemas.microsoft.com/office/drawing/2010/main">
                 <a:solidFill>
                   <a:srgbClr val="FFFFFF"/>
                 </a:solidFill>
@@ -9493,7 +9713,7 @@
           <a:blip r:embed="rId4" cstate="print">
             <a:extLst>
               <a:ext uri="{28A0092B-C50C-407E-A947-70E740481C1C}">
-                <a14:useLocalDpi xmlns:a14="http://schemas.microsoft.com/office/drawing/2010/main" xmlns="" val="0"/>
+                <a14:useLocalDpi xmlns="" xmlns:a14="http://schemas.microsoft.com/office/drawing/2010/main" val="0"/>
               </a:ext>
             </a:extLst>
           </a:blip>
@@ -9513,7 +9733,7 @@
           <a:noFill/>
           <a:extLst>
             <a:ext uri="{909E8E84-426E-40DD-AFC4-6F175D3DCCD1}">
-              <a14:hiddenFill xmlns:a14="http://schemas.microsoft.com/office/drawing/2010/main" xmlns="">
+              <a14:hiddenFill xmlns="" xmlns:a14="http://schemas.microsoft.com/office/drawing/2010/main">
                 <a:solidFill>
                   <a:srgbClr val="FFFFFF"/>
                 </a:solidFill>
@@ -9534,7 +9754,7 @@
           <a:blip r:embed="rId5" cstate="print">
             <a:extLst>
               <a:ext uri="{28A0092B-C50C-407E-A947-70E740481C1C}">
-                <a14:useLocalDpi xmlns:a14="http://schemas.microsoft.com/office/drawing/2010/main" xmlns="" val="0"/>
+                <a14:useLocalDpi xmlns="" xmlns:a14="http://schemas.microsoft.com/office/drawing/2010/main" val="0"/>
               </a:ext>
             </a:extLst>
           </a:blip>
@@ -9554,7 +9774,7 @@
           <a:noFill/>
           <a:extLst>
             <a:ext uri="{909E8E84-426E-40DD-AFC4-6F175D3DCCD1}">
-              <a14:hiddenFill xmlns:a14="http://schemas.microsoft.com/office/drawing/2010/main" xmlns="">
+              <a14:hiddenFill xmlns="" xmlns:a14="http://schemas.microsoft.com/office/drawing/2010/main">
                 <a:solidFill>
                   <a:srgbClr val="FFFFFF"/>
                 </a:solidFill>
@@ -9586,14 +9806,14 @@
           <a:effectLst/>
           <a:extLst>
             <a:ext uri="{909E8E84-426E-40DD-AFC4-6F175D3DCCD1}">
-              <a14:hiddenFill xmlns:a14="http://schemas.microsoft.com/office/drawing/2010/main" xmlns="">
+              <a14:hiddenFill xmlns="" xmlns:a14="http://schemas.microsoft.com/office/drawing/2010/main">
                 <a:solidFill>
                   <a:schemeClr val="accent1"/>
                 </a:solidFill>
               </a14:hiddenFill>
             </a:ext>
             <a:ext uri="{91240B29-F687-4F45-9708-019B960494DF}">
-              <a14:hiddenLine xmlns:a14="http://schemas.microsoft.com/office/drawing/2010/main" xmlns="" w="9525">
+              <a14:hiddenLine xmlns="" xmlns:a14="http://schemas.microsoft.com/office/drawing/2010/main" w="9525">
                 <a:solidFill>
                   <a:schemeClr val="tx1"/>
                 </a:solidFill>
@@ -9603,7 +9823,7 @@
               </a14:hiddenLine>
             </a:ext>
             <a:ext uri="{AF507438-7753-43E0-B8FC-AC1667EBCBE1}">
-              <a14:hiddenEffects xmlns:a14="http://schemas.microsoft.com/office/drawing/2010/main" xmlns="">
+              <a14:hiddenEffects xmlns="" xmlns:a14="http://schemas.microsoft.com/office/drawing/2010/main">
                 <a:effectLst>
                   <a:outerShdw dist="35921" dir="2700000" algn="ctr" rotWithShape="0">
                     <a:schemeClr val="bg2"/>
@@ -9626,10 +9846,54 @@
           </a:p>
         </p:txBody>
       </p:sp>
+      <p:sp>
+        <p:nvSpPr>
+          <p:cNvPr id="11" name="TextBox 10"/>
+          <p:cNvSpPr txBox="1"/>
+          <p:nvPr/>
+        </p:nvSpPr>
+        <p:spPr>
+          <a:xfrm>
+            <a:off x="6156176" y="620688"/>
+            <a:ext cx="1296144" cy="369332"/>
+          </a:xfrm>
+          <a:prstGeom prst="rect">
+            <a:avLst/>
+          </a:prstGeom>
+          <a:solidFill>
+            <a:srgbClr val="FF0000"/>
+          </a:solidFill>
+        </p:spPr>
+        <p:txBody>
+          <a:bodyPr wrap="square" rtlCol="0">
+            <a:spAutoFit/>
+          </a:bodyPr>
+          <a:lstStyle/>
+          <a:p>
+            <a:r>
+              <a:rPr lang="ko-KR" altLang="en-US" b="1" dirty="0" smtClean="0">
+                <a:solidFill>
+                  <a:schemeClr val="bg1">
+                    <a:lumMod val="95000"/>
+                  </a:schemeClr>
+                </a:solidFill>
+              </a:rPr>
+              <a:t>모델확인</a:t>
+            </a:r>
+            <a:endParaRPr lang="ko-KR" altLang="en-US" b="1" dirty="0">
+              <a:solidFill>
+                <a:schemeClr val="bg1">
+                  <a:lumMod val="95000"/>
+                </a:schemeClr>
+              </a:solidFill>
+            </a:endParaRPr>
+          </a:p>
+        </p:txBody>
+      </p:sp>
     </p:spTree>
     <p:extLst>
       <p:ext uri="{BB962C8B-B14F-4D97-AF65-F5344CB8AC3E}">
-        <p14:creationId xmlns:p14="http://schemas.microsoft.com/office/powerpoint/2010/main" xmlns="" val="2934949944"/>
+        <p14:creationId xmlns="" xmlns:p14="http://schemas.microsoft.com/office/powerpoint/2010/main" val="2934949944"/>
       </p:ext>
     </p:extLst>
   </p:cSld>
@@ -10070,14 +10334,14 @@
           <a:effectLst/>
           <a:extLst>
             <a:ext uri="{909E8E84-426E-40DD-AFC4-6F175D3DCCD1}">
-              <a14:hiddenFill xmlns:a14="http://schemas.microsoft.com/office/drawing/2010/main" xmlns="">
+              <a14:hiddenFill xmlns="" xmlns:a14="http://schemas.microsoft.com/office/drawing/2010/main">
                 <a:solidFill>
                   <a:schemeClr val="accent1"/>
                 </a:solidFill>
               </a14:hiddenFill>
             </a:ext>
             <a:ext uri="{91240B29-F687-4F45-9708-019B960494DF}">
-              <a14:hiddenLine xmlns:a14="http://schemas.microsoft.com/office/drawing/2010/main" xmlns="" w="9525">
+              <a14:hiddenLine xmlns="" xmlns:a14="http://schemas.microsoft.com/office/drawing/2010/main" w="9525">
                 <a:solidFill>
                   <a:schemeClr val="tx1"/>
                 </a:solidFill>
@@ -10087,7 +10351,7 @@
               </a14:hiddenLine>
             </a:ext>
             <a:ext uri="{AF507438-7753-43E0-B8FC-AC1667EBCBE1}">
-              <a14:hiddenEffects xmlns:a14="http://schemas.microsoft.com/office/drawing/2010/main" xmlns="">
+              <a14:hiddenEffects xmlns="" xmlns:a14="http://schemas.microsoft.com/office/drawing/2010/main">
                 <a:effectLst>
                   <a:outerShdw dist="35921" dir="2700000" algn="ctr" rotWithShape="0">
                     <a:schemeClr val="bg2"/>
@@ -10133,14 +10397,14 @@
           <a:effectLst/>
           <a:extLst>
             <a:ext uri="{909E8E84-426E-40DD-AFC4-6F175D3DCCD1}">
-              <a14:hiddenFill xmlns:a14="http://schemas.microsoft.com/office/drawing/2010/main" xmlns="">
+              <a14:hiddenFill xmlns="" xmlns:a14="http://schemas.microsoft.com/office/drawing/2010/main">
                 <a:solidFill>
                   <a:schemeClr val="accent1"/>
                 </a:solidFill>
               </a14:hiddenFill>
             </a:ext>
             <a:ext uri="{91240B29-F687-4F45-9708-019B960494DF}">
-              <a14:hiddenLine xmlns:a14="http://schemas.microsoft.com/office/drawing/2010/main" xmlns="" w="9525">
+              <a14:hiddenLine xmlns="" xmlns:a14="http://schemas.microsoft.com/office/drawing/2010/main" w="9525">
                 <a:solidFill>
                   <a:schemeClr val="tx1"/>
                 </a:solidFill>
@@ -10150,7 +10414,7 @@
               </a14:hiddenLine>
             </a:ext>
             <a:ext uri="{AF507438-7753-43E0-B8FC-AC1667EBCBE1}">
-              <a14:hiddenEffects xmlns:a14="http://schemas.microsoft.com/office/drawing/2010/main" xmlns="">
+              <a14:hiddenEffects xmlns="" xmlns:a14="http://schemas.microsoft.com/office/drawing/2010/main">
                 <a:effectLst>
                   <a:outerShdw dist="35921" dir="2700000" algn="ctr" rotWithShape="0">
                     <a:schemeClr val="bg2"/>
@@ -10196,14 +10460,14 @@
           <a:effectLst/>
           <a:extLst>
             <a:ext uri="{909E8E84-426E-40DD-AFC4-6F175D3DCCD1}">
-              <a14:hiddenFill xmlns:a14="http://schemas.microsoft.com/office/drawing/2010/main" xmlns="">
+              <a14:hiddenFill xmlns="" xmlns:a14="http://schemas.microsoft.com/office/drawing/2010/main">
                 <a:solidFill>
                   <a:schemeClr val="accent1"/>
                 </a:solidFill>
               </a14:hiddenFill>
             </a:ext>
             <a:ext uri="{91240B29-F687-4F45-9708-019B960494DF}">
-              <a14:hiddenLine xmlns:a14="http://schemas.microsoft.com/office/drawing/2010/main" xmlns="" w="9525">
+              <a14:hiddenLine xmlns="" xmlns:a14="http://schemas.microsoft.com/office/drawing/2010/main" w="9525">
                 <a:solidFill>
                   <a:schemeClr val="tx1"/>
                 </a:solidFill>
@@ -10213,7 +10477,7 @@
               </a14:hiddenLine>
             </a:ext>
             <a:ext uri="{AF507438-7753-43E0-B8FC-AC1667EBCBE1}">
-              <a14:hiddenEffects xmlns:a14="http://schemas.microsoft.com/office/drawing/2010/main" xmlns="">
+              <a14:hiddenEffects xmlns="" xmlns:a14="http://schemas.microsoft.com/office/drawing/2010/main">
                 <a:effectLst>
                   <a:outerShdw dist="35921" dir="2700000" algn="ctr" rotWithShape="0">
                     <a:schemeClr val="bg2"/>
@@ -10259,14 +10523,14 @@
           <a:effectLst/>
           <a:extLst>
             <a:ext uri="{909E8E84-426E-40DD-AFC4-6F175D3DCCD1}">
-              <a14:hiddenFill xmlns:a14="http://schemas.microsoft.com/office/drawing/2010/main" xmlns="">
+              <a14:hiddenFill xmlns="" xmlns:a14="http://schemas.microsoft.com/office/drawing/2010/main">
                 <a:solidFill>
                   <a:schemeClr val="accent1"/>
                 </a:solidFill>
               </a14:hiddenFill>
             </a:ext>
             <a:ext uri="{91240B29-F687-4F45-9708-019B960494DF}">
-              <a14:hiddenLine xmlns:a14="http://schemas.microsoft.com/office/drawing/2010/main" xmlns="" w="9525">
+              <a14:hiddenLine xmlns="" xmlns:a14="http://schemas.microsoft.com/office/drawing/2010/main" w="9525">
                 <a:solidFill>
                   <a:schemeClr val="tx1"/>
                 </a:solidFill>
@@ -10276,7 +10540,7 @@
               </a14:hiddenLine>
             </a:ext>
             <a:ext uri="{AF507438-7753-43E0-B8FC-AC1667EBCBE1}">
-              <a14:hiddenEffects xmlns:a14="http://schemas.microsoft.com/office/drawing/2010/main" xmlns="">
+              <a14:hiddenEffects xmlns="" xmlns:a14="http://schemas.microsoft.com/office/drawing/2010/main">
                 <a:effectLst>
                   <a:outerShdw dist="35921" dir="2700000" algn="ctr" rotWithShape="0">
                     <a:schemeClr val="bg2"/>
@@ -10322,14 +10586,14 @@
           <a:effectLst/>
           <a:extLst>
             <a:ext uri="{909E8E84-426E-40DD-AFC4-6F175D3DCCD1}">
-              <a14:hiddenFill xmlns:a14="http://schemas.microsoft.com/office/drawing/2010/main" xmlns="">
+              <a14:hiddenFill xmlns="" xmlns:a14="http://schemas.microsoft.com/office/drawing/2010/main">
                 <a:solidFill>
                   <a:schemeClr val="accent1"/>
                 </a:solidFill>
               </a14:hiddenFill>
             </a:ext>
             <a:ext uri="{91240B29-F687-4F45-9708-019B960494DF}">
-              <a14:hiddenLine xmlns:a14="http://schemas.microsoft.com/office/drawing/2010/main" xmlns="" w="9525">
+              <a14:hiddenLine xmlns="" xmlns:a14="http://schemas.microsoft.com/office/drawing/2010/main" w="9525">
                 <a:solidFill>
                   <a:schemeClr val="tx1"/>
                 </a:solidFill>
@@ -10339,7 +10603,7 @@
               </a14:hiddenLine>
             </a:ext>
             <a:ext uri="{AF507438-7753-43E0-B8FC-AC1667EBCBE1}">
-              <a14:hiddenEffects xmlns:a14="http://schemas.microsoft.com/office/drawing/2010/main" xmlns="">
+              <a14:hiddenEffects xmlns="" xmlns:a14="http://schemas.microsoft.com/office/drawing/2010/main">
                 <a:effectLst>
                   <a:outerShdw dist="35921" dir="2700000" algn="ctr" rotWithShape="0">
                     <a:schemeClr val="bg2"/>
@@ -10385,14 +10649,14 @@
           <a:effectLst/>
           <a:extLst>
             <a:ext uri="{909E8E84-426E-40DD-AFC4-6F175D3DCCD1}">
-              <a14:hiddenFill xmlns:a14="http://schemas.microsoft.com/office/drawing/2010/main" xmlns="">
+              <a14:hiddenFill xmlns="" xmlns:a14="http://schemas.microsoft.com/office/drawing/2010/main">
                 <a:solidFill>
                   <a:schemeClr val="accent1"/>
                 </a:solidFill>
               </a14:hiddenFill>
             </a:ext>
             <a:ext uri="{91240B29-F687-4F45-9708-019B960494DF}">
-              <a14:hiddenLine xmlns:a14="http://schemas.microsoft.com/office/drawing/2010/main" xmlns="" w="9525">
+              <a14:hiddenLine xmlns="" xmlns:a14="http://schemas.microsoft.com/office/drawing/2010/main" w="9525">
                 <a:solidFill>
                   <a:schemeClr val="tx1"/>
                 </a:solidFill>
@@ -10402,7 +10666,7 @@
               </a14:hiddenLine>
             </a:ext>
             <a:ext uri="{AF507438-7753-43E0-B8FC-AC1667EBCBE1}">
-              <a14:hiddenEffects xmlns:a14="http://schemas.microsoft.com/office/drawing/2010/main" xmlns="">
+              <a14:hiddenEffects xmlns="" xmlns:a14="http://schemas.microsoft.com/office/drawing/2010/main">
                 <a:effectLst>
                   <a:outerShdw dist="35921" dir="2700000" algn="ctr" rotWithShape="0">
                     <a:schemeClr val="bg2"/>
@@ -10448,14 +10712,14 @@
           <a:effectLst/>
           <a:extLst>
             <a:ext uri="{909E8E84-426E-40DD-AFC4-6F175D3DCCD1}">
-              <a14:hiddenFill xmlns:a14="http://schemas.microsoft.com/office/drawing/2010/main" xmlns="">
+              <a14:hiddenFill xmlns="" xmlns:a14="http://schemas.microsoft.com/office/drawing/2010/main">
                 <a:solidFill>
                   <a:schemeClr val="accent1"/>
                 </a:solidFill>
               </a14:hiddenFill>
             </a:ext>
             <a:ext uri="{91240B29-F687-4F45-9708-019B960494DF}">
-              <a14:hiddenLine xmlns:a14="http://schemas.microsoft.com/office/drawing/2010/main" xmlns="" w="9525">
+              <a14:hiddenLine xmlns="" xmlns:a14="http://schemas.microsoft.com/office/drawing/2010/main" w="9525">
                 <a:solidFill>
                   <a:schemeClr val="tx1"/>
                 </a:solidFill>
@@ -10465,7 +10729,7 @@
               </a14:hiddenLine>
             </a:ext>
             <a:ext uri="{AF507438-7753-43E0-B8FC-AC1667EBCBE1}">
-              <a14:hiddenEffects xmlns:a14="http://schemas.microsoft.com/office/drawing/2010/main" xmlns="">
+              <a14:hiddenEffects xmlns="" xmlns:a14="http://schemas.microsoft.com/office/drawing/2010/main">
                 <a:effectLst>
                   <a:outerShdw dist="35921" dir="2700000" algn="ctr" rotWithShape="0">
                     <a:schemeClr val="bg2"/>
@@ -10500,7 +10764,7 @@
           <a:blip r:embed="rId3" cstate="print">
             <a:extLst>
               <a:ext uri="{28A0092B-C50C-407E-A947-70E740481C1C}">
-                <a14:useLocalDpi xmlns:a14="http://schemas.microsoft.com/office/drawing/2010/main" xmlns="" val="0"/>
+                <a14:useLocalDpi xmlns="" xmlns:a14="http://schemas.microsoft.com/office/drawing/2010/main" val="0"/>
               </a:ext>
             </a:extLst>
           </a:blip>
@@ -10520,7 +10784,7 @@
           <a:noFill/>
           <a:extLst>
             <a:ext uri="{909E8E84-426E-40DD-AFC4-6F175D3DCCD1}">
-              <a14:hiddenFill xmlns:a14="http://schemas.microsoft.com/office/drawing/2010/main" xmlns="">
+              <a14:hiddenFill xmlns="" xmlns:a14="http://schemas.microsoft.com/office/drawing/2010/main">
                 <a:solidFill>
                   <a:srgbClr val="FFFFFF"/>
                 </a:solidFill>
@@ -10541,7 +10805,7 @@
           <a:blip r:embed="rId4" cstate="print">
             <a:extLst>
               <a:ext uri="{28A0092B-C50C-407E-A947-70E740481C1C}">
-                <a14:useLocalDpi xmlns:a14="http://schemas.microsoft.com/office/drawing/2010/main" xmlns="" val="0"/>
+                <a14:useLocalDpi xmlns="" xmlns:a14="http://schemas.microsoft.com/office/drawing/2010/main" val="0"/>
               </a:ext>
             </a:extLst>
           </a:blip>
@@ -10561,7 +10825,7 @@
           <a:noFill/>
           <a:extLst>
             <a:ext uri="{909E8E84-426E-40DD-AFC4-6F175D3DCCD1}">
-              <a14:hiddenFill xmlns:a14="http://schemas.microsoft.com/office/drawing/2010/main" xmlns="">
+              <a14:hiddenFill xmlns="" xmlns:a14="http://schemas.microsoft.com/office/drawing/2010/main">
                 <a:solidFill>
                   <a:srgbClr val="FFFFFF"/>
                 </a:solidFill>
@@ -10582,7 +10846,7 @@
           <a:blip r:embed="rId5" cstate="print">
             <a:extLst>
               <a:ext uri="{28A0092B-C50C-407E-A947-70E740481C1C}">
-                <a14:useLocalDpi xmlns:a14="http://schemas.microsoft.com/office/drawing/2010/main" xmlns="" val="0"/>
+                <a14:useLocalDpi xmlns="" xmlns:a14="http://schemas.microsoft.com/office/drawing/2010/main" val="0"/>
               </a:ext>
             </a:extLst>
           </a:blip>
@@ -10602,7 +10866,7 @@
           <a:noFill/>
           <a:extLst>
             <a:ext uri="{909E8E84-426E-40DD-AFC4-6F175D3DCCD1}">
-              <a14:hiddenFill xmlns:a14="http://schemas.microsoft.com/office/drawing/2010/main" xmlns="">
+              <a14:hiddenFill xmlns="" xmlns:a14="http://schemas.microsoft.com/office/drawing/2010/main">
                 <a:solidFill>
                   <a:srgbClr val="FFFFFF"/>
                 </a:solidFill>
@@ -10623,7 +10887,7 @@
           <a:blip r:embed="rId6" cstate="print">
             <a:extLst>
               <a:ext uri="{28A0092B-C50C-407E-A947-70E740481C1C}">
-                <a14:useLocalDpi xmlns:a14="http://schemas.microsoft.com/office/drawing/2010/main" xmlns="" val="0"/>
+                <a14:useLocalDpi xmlns="" xmlns:a14="http://schemas.microsoft.com/office/drawing/2010/main" val="0"/>
               </a:ext>
             </a:extLst>
           </a:blip>
@@ -10643,7 +10907,7 @@
           <a:noFill/>
           <a:extLst>
             <a:ext uri="{909E8E84-426E-40DD-AFC4-6F175D3DCCD1}">
-              <a14:hiddenFill xmlns:a14="http://schemas.microsoft.com/office/drawing/2010/main" xmlns="">
+              <a14:hiddenFill xmlns="" xmlns:a14="http://schemas.microsoft.com/office/drawing/2010/main">
                 <a:solidFill>
                   <a:srgbClr val="FFFFFF"/>
                 </a:solidFill>
@@ -10675,14 +10939,14 @@
           <a:effectLst/>
           <a:extLst>
             <a:ext uri="{909E8E84-426E-40DD-AFC4-6F175D3DCCD1}">
-              <a14:hiddenFill xmlns:a14="http://schemas.microsoft.com/office/drawing/2010/main" xmlns="">
+              <a14:hiddenFill xmlns="" xmlns:a14="http://schemas.microsoft.com/office/drawing/2010/main">
                 <a:solidFill>
                   <a:schemeClr val="accent1"/>
                 </a:solidFill>
               </a14:hiddenFill>
             </a:ext>
             <a:ext uri="{91240B29-F687-4F45-9708-019B960494DF}">
-              <a14:hiddenLine xmlns:a14="http://schemas.microsoft.com/office/drawing/2010/main" xmlns="" w="9525">
+              <a14:hiddenLine xmlns="" xmlns:a14="http://schemas.microsoft.com/office/drawing/2010/main" w="9525">
                 <a:solidFill>
                   <a:schemeClr val="tx1"/>
                 </a:solidFill>
@@ -10692,7 +10956,7 @@
               </a14:hiddenLine>
             </a:ext>
             <a:ext uri="{AF507438-7753-43E0-B8FC-AC1667EBCBE1}">
-              <a14:hiddenEffects xmlns:a14="http://schemas.microsoft.com/office/drawing/2010/main" xmlns="">
+              <a14:hiddenEffects xmlns="" xmlns:a14="http://schemas.microsoft.com/office/drawing/2010/main">
                 <a:effectLst>
                   <a:outerShdw dist="35921" dir="2700000" algn="ctr" rotWithShape="0">
                     <a:schemeClr val="bg2"/>
@@ -10715,10 +10979,54 @@
           </a:p>
         </p:txBody>
       </p:sp>
+      <p:sp>
+        <p:nvSpPr>
+          <p:cNvPr id="16" name="TextBox 15"/>
+          <p:cNvSpPr txBox="1"/>
+          <p:nvPr/>
+        </p:nvSpPr>
+        <p:spPr>
+          <a:xfrm>
+            <a:off x="6156176" y="620688"/>
+            <a:ext cx="1296144" cy="369332"/>
+          </a:xfrm>
+          <a:prstGeom prst="rect">
+            <a:avLst/>
+          </a:prstGeom>
+          <a:solidFill>
+            <a:srgbClr val="FF0000"/>
+          </a:solidFill>
+        </p:spPr>
+        <p:txBody>
+          <a:bodyPr wrap="square" rtlCol="0">
+            <a:spAutoFit/>
+          </a:bodyPr>
+          <a:lstStyle/>
+          <a:p>
+            <a:r>
+              <a:rPr lang="ko-KR" altLang="en-US" b="1" dirty="0" smtClean="0">
+                <a:solidFill>
+                  <a:schemeClr val="bg1">
+                    <a:lumMod val="95000"/>
+                  </a:schemeClr>
+                </a:solidFill>
+              </a:rPr>
+              <a:t>모델확인</a:t>
+            </a:r>
+            <a:endParaRPr lang="ko-KR" altLang="en-US" b="1" dirty="0">
+              <a:solidFill>
+                <a:schemeClr val="bg1">
+                  <a:lumMod val="95000"/>
+                </a:schemeClr>
+              </a:solidFill>
+            </a:endParaRPr>
+          </a:p>
+        </p:txBody>
+      </p:sp>
     </p:spTree>
     <p:extLst>
       <p:ext uri="{BB962C8B-B14F-4D97-AF65-F5344CB8AC3E}">
-        <p14:creationId xmlns:p14="http://schemas.microsoft.com/office/powerpoint/2010/main" xmlns="" val="2036623237"/>
+        <p14:creationId xmlns="" xmlns:p14="http://schemas.microsoft.com/office/powerpoint/2010/main" val="2036623237"/>
       </p:ext>
     </p:extLst>
   </p:cSld>
@@ -11121,7 +11429,7 @@
           <a:blip r:embed="rId3" cstate="print">
             <a:extLst>
               <a:ext uri="{28A0092B-C50C-407E-A947-70E740481C1C}">
-                <a14:useLocalDpi xmlns:a14="http://schemas.microsoft.com/office/drawing/2010/main" xmlns="" val="0"/>
+                <a14:useLocalDpi xmlns="" xmlns:a14="http://schemas.microsoft.com/office/drawing/2010/main" val="0"/>
               </a:ext>
             </a:extLst>
           </a:blip>
@@ -11141,7 +11449,7 @@
           <a:noFill/>
           <a:extLst>
             <a:ext uri="{909E8E84-426E-40DD-AFC4-6F175D3DCCD1}">
-              <a14:hiddenFill xmlns:a14="http://schemas.microsoft.com/office/drawing/2010/main" xmlns="">
+              <a14:hiddenFill xmlns="" xmlns:a14="http://schemas.microsoft.com/office/drawing/2010/main">
                 <a:solidFill>
                   <a:srgbClr val="FFFFFF"/>
                 </a:solidFill>
@@ -11162,7 +11470,7 @@
           <a:blip r:embed="rId4" cstate="print">
             <a:extLst>
               <a:ext uri="{28A0092B-C50C-407E-A947-70E740481C1C}">
-                <a14:useLocalDpi xmlns:a14="http://schemas.microsoft.com/office/drawing/2010/main" xmlns="" val="0"/>
+                <a14:useLocalDpi xmlns="" xmlns:a14="http://schemas.microsoft.com/office/drawing/2010/main" val="0"/>
               </a:ext>
             </a:extLst>
           </a:blip>
@@ -11182,7 +11490,7 @@
           <a:noFill/>
           <a:extLst>
             <a:ext uri="{909E8E84-426E-40DD-AFC4-6F175D3DCCD1}">
-              <a14:hiddenFill xmlns:a14="http://schemas.microsoft.com/office/drawing/2010/main" xmlns="">
+              <a14:hiddenFill xmlns="" xmlns:a14="http://schemas.microsoft.com/office/drawing/2010/main">
                 <a:solidFill>
                   <a:srgbClr val="FFFFFF"/>
                 </a:solidFill>
@@ -11203,7 +11511,7 @@
           <a:blip r:embed="rId5" cstate="print">
             <a:extLst>
               <a:ext uri="{28A0092B-C50C-407E-A947-70E740481C1C}">
-                <a14:useLocalDpi xmlns:a14="http://schemas.microsoft.com/office/drawing/2010/main" xmlns="" val="0"/>
+                <a14:useLocalDpi xmlns="" xmlns:a14="http://schemas.microsoft.com/office/drawing/2010/main" val="0"/>
               </a:ext>
             </a:extLst>
           </a:blip>
@@ -11223,7 +11531,7 @@
           <a:noFill/>
           <a:extLst>
             <a:ext uri="{909E8E84-426E-40DD-AFC4-6F175D3DCCD1}">
-              <a14:hiddenFill xmlns:a14="http://schemas.microsoft.com/office/drawing/2010/main" xmlns="">
+              <a14:hiddenFill xmlns="" xmlns:a14="http://schemas.microsoft.com/office/drawing/2010/main">
                 <a:solidFill>
                   <a:srgbClr val="FFFFFF"/>
                 </a:solidFill>
@@ -11244,7 +11552,7 @@
           <a:blip r:embed="rId6" cstate="print">
             <a:extLst>
               <a:ext uri="{28A0092B-C50C-407E-A947-70E740481C1C}">
-                <a14:useLocalDpi xmlns:a14="http://schemas.microsoft.com/office/drawing/2010/main" xmlns="" val="0"/>
+                <a14:useLocalDpi xmlns="" xmlns:a14="http://schemas.microsoft.com/office/drawing/2010/main" val="0"/>
               </a:ext>
             </a:extLst>
           </a:blip>
@@ -11264,7 +11572,7 @@
           <a:noFill/>
           <a:extLst>
             <a:ext uri="{909E8E84-426E-40DD-AFC4-6F175D3DCCD1}">
-              <a14:hiddenFill xmlns:a14="http://schemas.microsoft.com/office/drawing/2010/main" xmlns="">
+              <a14:hiddenFill xmlns="" xmlns:a14="http://schemas.microsoft.com/office/drawing/2010/main">
                 <a:solidFill>
                   <a:srgbClr val="FFFFFF"/>
                 </a:solidFill>
@@ -11296,14 +11604,14 @@
           <a:effectLst/>
           <a:extLst>
             <a:ext uri="{909E8E84-426E-40DD-AFC4-6F175D3DCCD1}">
-              <a14:hiddenFill xmlns:a14="http://schemas.microsoft.com/office/drawing/2010/main" xmlns="">
+              <a14:hiddenFill xmlns="" xmlns:a14="http://schemas.microsoft.com/office/drawing/2010/main">
                 <a:solidFill>
                   <a:schemeClr val="accent1"/>
                 </a:solidFill>
               </a14:hiddenFill>
             </a:ext>
             <a:ext uri="{91240B29-F687-4F45-9708-019B960494DF}">
-              <a14:hiddenLine xmlns:a14="http://schemas.microsoft.com/office/drawing/2010/main" xmlns="" w="9525">
+              <a14:hiddenLine xmlns="" xmlns:a14="http://schemas.microsoft.com/office/drawing/2010/main" w="9525">
                 <a:solidFill>
                   <a:schemeClr val="tx1"/>
                 </a:solidFill>
@@ -11313,7 +11621,7 @@
               </a14:hiddenLine>
             </a:ext>
             <a:ext uri="{AF507438-7753-43E0-B8FC-AC1667EBCBE1}">
-              <a14:hiddenEffects xmlns:a14="http://schemas.microsoft.com/office/drawing/2010/main" xmlns="">
+              <a14:hiddenEffects xmlns="" xmlns:a14="http://schemas.microsoft.com/office/drawing/2010/main">
                 <a:effectLst>
                   <a:outerShdw dist="35921" dir="2700000" algn="ctr" rotWithShape="0">
                     <a:schemeClr val="bg2"/>
@@ -11336,10 +11644,54 @@
           </a:p>
         </p:txBody>
       </p:sp>
+      <p:sp>
+        <p:nvSpPr>
+          <p:cNvPr id="9" name="TextBox 8"/>
+          <p:cNvSpPr txBox="1"/>
+          <p:nvPr/>
+        </p:nvSpPr>
+        <p:spPr>
+          <a:xfrm>
+            <a:off x="6156176" y="620688"/>
+            <a:ext cx="1296144" cy="369332"/>
+          </a:xfrm>
+          <a:prstGeom prst="rect">
+            <a:avLst/>
+          </a:prstGeom>
+          <a:solidFill>
+            <a:srgbClr val="FF0000"/>
+          </a:solidFill>
+        </p:spPr>
+        <p:txBody>
+          <a:bodyPr wrap="square" rtlCol="0">
+            <a:spAutoFit/>
+          </a:bodyPr>
+          <a:lstStyle/>
+          <a:p>
+            <a:r>
+              <a:rPr lang="ko-KR" altLang="en-US" b="1" dirty="0" smtClean="0">
+                <a:solidFill>
+                  <a:schemeClr val="bg1">
+                    <a:lumMod val="95000"/>
+                  </a:schemeClr>
+                </a:solidFill>
+              </a:rPr>
+              <a:t>모델확인</a:t>
+            </a:r>
+            <a:endParaRPr lang="ko-KR" altLang="en-US" b="1" dirty="0">
+              <a:solidFill>
+                <a:schemeClr val="bg1">
+                  <a:lumMod val="95000"/>
+                </a:schemeClr>
+              </a:solidFill>
+            </a:endParaRPr>
+          </a:p>
+        </p:txBody>
+      </p:sp>
     </p:spTree>
     <p:extLst>
       <p:ext uri="{BB962C8B-B14F-4D97-AF65-F5344CB8AC3E}">
-        <p14:creationId xmlns:p14="http://schemas.microsoft.com/office/powerpoint/2010/main" xmlns="" val="1731765846"/>
+        <p14:creationId xmlns="" xmlns:p14="http://schemas.microsoft.com/office/powerpoint/2010/main" val="1731765846"/>
       </p:ext>
     </p:extLst>
   </p:cSld>
@@ -11746,14 +12098,14 @@
           <a:effectLst/>
           <a:extLst>
             <a:ext uri="{909E8E84-426E-40DD-AFC4-6F175D3DCCD1}">
-              <a14:hiddenFill xmlns:a14="http://schemas.microsoft.com/office/drawing/2010/main" xmlns="">
+              <a14:hiddenFill xmlns="" xmlns:a14="http://schemas.microsoft.com/office/drawing/2010/main">
                 <a:solidFill>
                   <a:schemeClr val="accent1"/>
                 </a:solidFill>
               </a14:hiddenFill>
             </a:ext>
             <a:ext uri="{91240B29-F687-4F45-9708-019B960494DF}">
-              <a14:hiddenLine xmlns:a14="http://schemas.microsoft.com/office/drawing/2010/main" xmlns="" w="9525">
+              <a14:hiddenLine xmlns="" xmlns:a14="http://schemas.microsoft.com/office/drawing/2010/main" w="9525">
                 <a:solidFill>
                   <a:schemeClr val="tx1"/>
                 </a:solidFill>
@@ -11763,7 +12115,7 @@
               </a14:hiddenLine>
             </a:ext>
             <a:ext uri="{AF507438-7753-43E0-B8FC-AC1667EBCBE1}">
-              <a14:hiddenEffects xmlns:a14="http://schemas.microsoft.com/office/drawing/2010/main" xmlns="">
+              <a14:hiddenEffects xmlns="" xmlns:a14="http://schemas.microsoft.com/office/drawing/2010/main">
                 <a:effectLst>
                   <a:outerShdw dist="35921" dir="2700000" algn="ctr" rotWithShape="0">
                     <a:schemeClr val="bg2"/>
@@ -11798,7 +12150,7 @@
           <a:blip r:embed="rId3" cstate="print">
             <a:extLst>
               <a:ext uri="{28A0092B-C50C-407E-A947-70E740481C1C}">
-                <a14:useLocalDpi xmlns:a14="http://schemas.microsoft.com/office/drawing/2010/main" xmlns="" val="0"/>
+                <a14:useLocalDpi xmlns="" xmlns:a14="http://schemas.microsoft.com/office/drawing/2010/main" val="0"/>
               </a:ext>
             </a:extLst>
           </a:blip>
@@ -11818,7 +12170,7 @@
           <a:noFill/>
           <a:extLst>
             <a:ext uri="{909E8E84-426E-40DD-AFC4-6F175D3DCCD1}">
-              <a14:hiddenFill xmlns:a14="http://schemas.microsoft.com/office/drawing/2010/main" xmlns="">
+              <a14:hiddenFill xmlns="" xmlns:a14="http://schemas.microsoft.com/office/drawing/2010/main">
                 <a:solidFill>
                   <a:srgbClr val="FFFFFF"/>
                 </a:solidFill>
@@ -11839,7 +12191,7 @@
           <a:blip r:embed="rId4" cstate="print">
             <a:extLst>
               <a:ext uri="{28A0092B-C50C-407E-A947-70E740481C1C}">
-                <a14:useLocalDpi xmlns:a14="http://schemas.microsoft.com/office/drawing/2010/main" xmlns="" val="0"/>
+                <a14:useLocalDpi xmlns="" xmlns:a14="http://schemas.microsoft.com/office/drawing/2010/main" val="0"/>
               </a:ext>
             </a:extLst>
           </a:blip>
@@ -11859,7 +12211,7 @@
           <a:noFill/>
           <a:extLst>
             <a:ext uri="{909E8E84-426E-40DD-AFC4-6F175D3DCCD1}">
-              <a14:hiddenFill xmlns:a14="http://schemas.microsoft.com/office/drawing/2010/main" xmlns="">
+              <a14:hiddenFill xmlns="" xmlns:a14="http://schemas.microsoft.com/office/drawing/2010/main">
                 <a:solidFill>
                   <a:srgbClr val="FFFFFF"/>
                 </a:solidFill>
@@ -11880,7 +12232,7 @@
           <a:blip r:embed="rId5" cstate="print">
             <a:extLst>
               <a:ext uri="{28A0092B-C50C-407E-A947-70E740481C1C}">
-                <a14:useLocalDpi xmlns:a14="http://schemas.microsoft.com/office/drawing/2010/main" xmlns="" val="0"/>
+                <a14:useLocalDpi xmlns="" xmlns:a14="http://schemas.microsoft.com/office/drawing/2010/main" val="0"/>
               </a:ext>
             </a:extLst>
           </a:blip>
@@ -11900,7 +12252,7 @@
           <a:noFill/>
           <a:extLst>
             <a:ext uri="{909E8E84-426E-40DD-AFC4-6F175D3DCCD1}">
-              <a14:hiddenFill xmlns:a14="http://schemas.microsoft.com/office/drawing/2010/main" xmlns="">
+              <a14:hiddenFill xmlns="" xmlns:a14="http://schemas.microsoft.com/office/drawing/2010/main">
                 <a:solidFill>
                   <a:srgbClr val="FFFFFF"/>
                 </a:solidFill>
@@ -11921,7 +12273,7 @@
           <a:blip r:embed="rId6" cstate="print">
             <a:extLst>
               <a:ext uri="{28A0092B-C50C-407E-A947-70E740481C1C}">
-                <a14:useLocalDpi xmlns:a14="http://schemas.microsoft.com/office/drawing/2010/main" xmlns="" val="0"/>
+                <a14:useLocalDpi xmlns="" xmlns:a14="http://schemas.microsoft.com/office/drawing/2010/main" val="0"/>
               </a:ext>
             </a:extLst>
           </a:blip>
@@ -11941,7 +12293,7 @@
           <a:noFill/>
           <a:extLst>
             <a:ext uri="{909E8E84-426E-40DD-AFC4-6F175D3DCCD1}">
-              <a14:hiddenFill xmlns:a14="http://schemas.microsoft.com/office/drawing/2010/main" xmlns="">
+              <a14:hiddenFill xmlns="" xmlns:a14="http://schemas.microsoft.com/office/drawing/2010/main">
                 <a:solidFill>
                   <a:srgbClr val="FFFFFF"/>
                 </a:solidFill>
@@ -11973,14 +12325,14 @@
           <a:effectLst/>
           <a:extLst>
             <a:ext uri="{909E8E84-426E-40DD-AFC4-6F175D3DCCD1}">
-              <a14:hiddenFill xmlns:a14="http://schemas.microsoft.com/office/drawing/2010/main" xmlns="">
+              <a14:hiddenFill xmlns="" xmlns:a14="http://schemas.microsoft.com/office/drawing/2010/main">
                 <a:solidFill>
                   <a:schemeClr val="accent1"/>
                 </a:solidFill>
               </a14:hiddenFill>
             </a:ext>
             <a:ext uri="{91240B29-F687-4F45-9708-019B960494DF}">
-              <a14:hiddenLine xmlns:a14="http://schemas.microsoft.com/office/drawing/2010/main" xmlns="" w="9525">
+              <a14:hiddenLine xmlns="" xmlns:a14="http://schemas.microsoft.com/office/drawing/2010/main" w="9525">
                 <a:solidFill>
                   <a:schemeClr val="tx1"/>
                 </a:solidFill>
@@ -11990,7 +12342,7 @@
               </a14:hiddenLine>
             </a:ext>
             <a:ext uri="{AF507438-7753-43E0-B8FC-AC1667EBCBE1}">
-              <a14:hiddenEffects xmlns:a14="http://schemas.microsoft.com/office/drawing/2010/main" xmlns="">
+              <a14:hiddenEffects xmlns="" xmlns:a14="http://schemas.microsoft.com/office/drawing/2010/main">
                 <a:effectLst>
                   <a:outerShdw dist="35921" dir="2700000" algn="ctr" rotWithShape="0">
                     <a:schemeClr val="bg2"/>
@@ -12013,10 +12365,54 @@
           </a:p>
         </p:txBody>
       </p:sp>
+      <p:sp>
+        <p:nvSpPr>
+          <p:cNvPr id="10" name="TextBox 9"/>
+          <p:cNvSpPr txBox="1"/>
+          <p:nvPr/>
+        </p:nvSpPr>
+        <p:spPr>
+          <a:xfrm>
+            <a:off x="6156176" y="620688"/>
+            <a:ext cx="1296144" cy="369332"/>
+          </a:xfrm>
+          <a:prstGeom prst="rect">
+            <a:avLst/>
+          </a:prstGeom>
+          <a:solidFill>
+            <a:srgbClr val="FF0000"/>
+          </a:solidFill>
+        </p:spPr>
+        <p:txBody>
+          <a:bodyPr wrap="square" rtlCol="0">
+            <a:spAutoFit/>
+          </a:bodyPr>
+          <a:lstStyle/>
+          <a:p>
+            <a:r>
+              <a:rPr lang="ko-KR" altLang="en-US" b="1" dirty="0" smtClean="0">
+                <a:solidFill>
+                  <a:schemeClr val="bg1">
+                    <a:lumMod val="95000"/>
+                  </a:schemeClr>
+                </a:solidFill>
+              </a:rPr>
+              <a:t>모델확인</a:t>
+            </a:r>
+            <a:endParaRPr lang="ko-KR" altLang="en-US" b="1" dirty="0">
+              <a:solidFill>
+                <a:schemeClr val="bg1">
+                  <a:lumMod val="95000"/>
+                </a:schemeClr>
+              </a:solidFill>
+            </a:endParaRPr>
+          </a:p>
+        </p:txBody>
+      </p:sp>
     </p:spTree>
     <p:extLst>
       <p:ext uri="{BB962C8B-B14F-4D97-AF65-F5344CB8AC3E}">
-        <p14:creationId xmlns:p14="http://schemas.microsoft.com/office/powerpoint/2010/main" xmlns="" val="226143994"/>
+        <p14:creationId xmlns="" xmlns:p14="http://schemas.microsoft.com/office/powerpoint/2010/main" val="226143994"/>
       </p:ext>
     </p:extLst>
   </p:cSld>
@@ -12462,14 +12858,14 @@
           <a:effectLst/>
           <a:extLst>
             <a:ext uri="{909E8E84-426E-40DD-AFC4-6F175D3DCCD1}">
-              <a14:hiddenFill xmlns:a14="http://schemas.microsoft.com/office/drawing/2010/main" xmlns="">
+              <a14:hiddenFill xmlns="" xmlns:a14="http://schemas.microsoft.com/office/drawing/2010/main">
                 <a:solidFill>
                   <a:schemeClr val="accent1"/>
                 </a:solidFill>
               </a14:hiddenFill>
             </a:ext>
             <a:ext uri="{91240B29-F687-4F45-9708-019B960494DF}">
-              <a14:hiddenLine xmlns:a14="http://schemas.microsoft.com/office/drawing/2010/main" xmlns="" w="9525">
+              <a14:hiddenLine xmlns="" xmlns:a14="http://schemas.microsoft.com/office/drawing/2010/main" w="9525">
                 <a:solidFill>
                   <a:schemeClr val="tx1"/>
                 </a:solidFill>
@@ -12479,7 +12875,7 @@
               </a14:hiddenLine>
             </a:ext>
             <a:ext uri="{AF507438-7753-43E0-B8FC-AC1667EBCBE1}">
-              <a14:hiddenEffects xmlns:a14="http://schemas.microsoft.com/office/drawing/2010/main" xmlns="">
+              <a14:hiddenEffects xmlns="" xmlns:a14="http://schemas.microsoft.com/office/drawing/2010/main">
                 <a:effectLst>
                   <a:outerShdw dist="35921" dir="2700000" algn="ctr" rotWithShape="0">
                     <a:schemeClr val="bg2"/>
@@ -12525,14 +12921,14 @@
           <a:effectLst/>
           <a:extLst>
             <a:ext uri="{909E8E84-426E-40DD-AFC4-6F175D3DCCD1}">
-              <a14:hiddenFill xmlns:a14="http://schemas.microsoft.com/office/drawing/2010/main" xmlns="">
+              <a14:hiddenFill xmlns="" xmlns:a14="http://schemas.microsoft.com/office/drawing/2010/main">
                 <a:solidFill>
                   <a:schemeClr val="accent1"/>
                 </a:solidFill>
               </a14:hiddenFill>
             </a:ext>
             <a:ext uri="{91240B29-F687-4F45-9708-019B960494DF}">
-              <a14:hiddenLine xmlns:a14="http://schemas.microsoft.com/office/drawing/2010/main" xmlns="" w="9525">
+              <a14:hiddenLine xmlns="" xmlns:a14="http://schemas.microsoft.com/office/drawing/2010/main" w="9525">
                 <a:solidFill>
                   <a:schemeClr val="tx1"/>
                 </a:solidFill>
@@ -12542,7 +12938,7 @@
               </a14:hiddenLine>
             </a:ext>
             <a:ext uri="{AF507438-7753-43E0-B8FC-AC1667EBCBE1}">
-              <a14:hiddenEffects xmlns:a14="http://schemas.microsoft.com/office/drawing/2010/main" xmlns="">
+              <a14:hiddenEffects xmlns="" xmlns:a14="http://schemas.microsoft.com/office/drawing/2010/main">
                 <a:effectLst>
                   <a:outerShdw dist="35921" dir="2700000" algn="ctr" rotWithShape="0">
                     <a:schemeClr val="bg2"/>
@@ -12577,7 +12973,7 @@
           <a:blip r:embed="rId3" cstate="print">
             <a:extLst>
               <a:ext uri="{28A0092B-C50C-407E-A947-70E740481C1C}">
-                <a14:useLocalDpi xmlns:a14="http://schemas.microsoft.com/office/drawing/2010/main" xmlns="" val="0"/>
+                <a14:useLocalDpi xmlns="" xmlns:a14="http://schemas.microsoft.com/office/drawing/2010/main" val="0"/>
               </a:ext>
             </a:extLst>
           </a:blip>
@@ -12597,7 +12993,7 @@
           <a:noFill/>
           <a:extLst>
             <a:ext uri="{909E8E84-426E-40DD-AFC4-6F175D3DCCD1}">
-              <a14:hiddenFill xmlns:a14="http://schemas.microsoft.com/office/drawing/2010/main" xmlns="">
+              <a14:hiddenFill xmlns="" xmlns:a14="http://schemas.microsoft.com/office/drawing/2010/main">
                 <a:solidFill>
                   <a:srgbClr val="FFFFFF"/>
                 </a:solidFill>
@@ -12618,7 +13014,7 @@
           <a:blip r:embed="rId4" cstate="print">
             <a:extLst>
               <a:ext uri="{28A0092B-C50C-407E-A947-70E740481C1C}">
-                <a14:useLocalDpi xmlns:a14="http://schemas.microsoft.com/office/drawing/2010/main" xmlns="" val="0"/>
+                <a14:useLocalDpi xmlns="" xmlns:a14="http://schemas.microsoft.com/office/drawing/2010/main" val="0"/>
               </a:ext>
             </a:extLst>
           </a:blip>
@@ -12638,7 +13034,7 @@
           <a:noFill/>
           <a:extLst>
             <a:ext uri="{909E8E84-426E-40DD-AFC4-6F175D3DCCD1}">
-              <a14:hiddenFill xmlns:a14="http://schemas.microsoft.com/office/drawing/2010/main" xmlns="">
+              <a14:hiddenFill xmlns="" xmlns:a14="http://schemas.microsoft.com/office/drawing/2010/main">
                 <a:solidFill>
                   <a:srgbClr val="FFFFFF"/>
                 </a:solidFill>
@@ -12659,7 +13055,7 @@
           <a:blip r:embed="rId5" cstate="print">
             <a:extLst>
               <a:ext uri="{28A0092B-C50C-407E-A947-70E740481C1C}">
-                <a14:useLocalDpi xmlns:a14="http://schemas.microsoft.com/office/drawing/2010/main" xmlns="" val="0"/>
+                <a14:useLocalDpi xmlns="" xmlns:a14="http://schemas.microsoft.com/office/drawing/2010/main" val="0"/>
               </a:ext>
             </a:extLst>
           </a:blip>
@@ -12679,7 +13075,7 @@
           <a:noFill/>
           <a:extLst>
             <a:ext uri="{909E8E84-426E-40DD-AFC4-6F175D3DCCD1}">
-              <a14:hiddenFill xmlns:a14="http://schemas.microsoft.com/office/drawing/2010/main" xmlns="">
+              <a14:hiddenFill xmlns="" xmlns:a14="http://schemas.microsoft.com/office/drawing/2010/main">
                 <a:solidFill>
                   <a:srgbClr val="FFFFFF"/>
                 </a:solidFill>
@@ -12700,7 +13096,7 @@
           <a:blip r:embed="rId6" cstate="print">
             <a:extLst>
               <a:ext uri="{28A0092B-C50C-407E-A947-70E740481C1C}">
-                <a14:useLocalDpi xmlns:a14="http://schemas.microsoft.com/office/drawing/2010/main" xmlns="" val="0"/>
+                <a14:useLocalDpi xmlns="" xmlns:a14="http://schemas.microsoft.com/office/drawing/2010/main" val="0"/>
               </a:ext>
             </a:extLst>
           </a:blip>
@@ -12720,7 +13116,7 @@
           <a:noFill/>
           <a:extLst>
             <a:ext uri="{909E8E84-426E-40DD-AFC4-6F175D3DCCD1}">
-              <a14:hiddenFill xmlns:a14="http://schemas.microsoft.com/office/drawing/2010/main" xmlns="">
+              <a14:hiddenFill xmlns="" xmlns:a14="http://schemas.microsoft.com/office/drawing/2010/main">
                 <a:solidFill>
                   <a:srgbClr val="FFFFFF"/>
                 </a:solidFill>
@@ -12752,14 +13148,14 @@
           <a:effectLst/>
           <a:extLst>
             <a:ext uri="{909E8E84-426E-40DD-AFC4-6F175D3DCCD1}">
-              <a14:hiddenFill xmlns:a14="http://schemas.microsoft.com/office/drawing/2010/main" xmlns="">
+              <a14:hiddenFill xmlns="" xmlns:a14="http://schemas.microsoft.com/office/drawing/2010/main">
                 <a:solidFill>
                   <a:schemeClr val="accent1"/>
                 </a:solidFill>
               </a14:hiddenFill>
             </a:ext>
             <a:ext uri="{91240B29-F687-4F45-9708-019B960494DF}">
-              <a14:hiddenLine xmlns:a14="http://schemas.microsoft.com/office/drawing/2010/main" xmlns="" w="9525">
+              <a14:hiddenLine xmlns="" xmlns:a14="http://schemas.microsoft.com/office/drawing/2010/main" w="9525">
                 <a:solidFill>
                   <a:schemeClr val="tx1"/>
                 </a:solidFill>
@@ -12769,7 +13165,7 @@
               </a14:hiddenLine>
             </a:ext>
             <a:ext uri="{AF507438-7753-43E0-B8FC-AC1667EBCBE1}">
-              <a14:hiddenEffects xmlns:a14="http://schemas.microsoft.com/office/drawing/2010/main" xmlns="">
+              <a14:hiddenEffects xmlns="" xmlns:a14="http://schemas.microsoft.com/office/drawing/2010/main">
                 <a:effectLst>
                   <a:outerShdw dist="35921" dir="2700000" algn="ctr" rotWithShape="0">
                     <a:schemeClr val="bg2"/>
@@ -12792,10 +13188,54 @@
           </a:p>
         </p:txBody>
       </p:sp>
+      <p:sp>
+        <p:nvSpPr>
+          <p:cNvPr id="11" name="TextBox 10"/>
+          <p:cNvSpPr txBox="1"/>
+          <p:nvPr/>
+        </p:nvSpPr>
+        <p:spPr>
+          <a:xfrm>
+            <a:off x="6156176" y="620688"/>
+            <a:ext cx="1296144" cy="369332"/>
+          </a:xfrm>
+          <a:prstGeom prst="rect">
+            <a:avLst/>
+          </a:prstGeom>
+          <a:solidFill>
+            <a:srgbClr val="FF0000"/>
+          </a:solidFill>
+        </p:spPr>
+        <p:txBody>
+          <a:bodyPr wrap="square" rtlCol="0">
+            <a:spAutoFit/>
+          </a:bodyPr>
+          <a:lstStyle/>
+          <a:p>
+            <a:r>
+              <a:rPr lang="ko-KR" altLang="en-US" b="1" dirty="0" smtClean="0">
+                <a:solidFill>
+                  <a:schemeClr val="bg1">
+                    <a:lumMod val="95000"/>
+                  </a:schemeClr>
+                </a:solidFill>
+              </a:rPr>
+              <a:t>모델확인</a:t>
+            </a:r>
+            <a:endParaRPr lang="ko-KR" altLang="en-US" b="1" dirty="0">
+              <a:solidFill>
+                <a:schemeClr val="bg1">
+                  <a:lumMod val="95000"/>
+                </a:schemeClr>
+              </a:solidFill>
+            </a:endParaRPr>
+          </a:p>
+        </p:txBody>
+      </p:sp>
     </p:spTree>
     <p:extLst>
       <p:ext uri="{BB962C8B-B14F-4D97-AF65-F5344CB8AC3E}">
-        <p14:creationId xmlns:p14="http://schemas.microsoft.com/office/powerpoint/2010/main" xmlns="" val="1672123786"/>
+        <p14:creationId xmlns="" xmlns:p14="http://schemas.microsoft.com/office/powerpoint/2010/main" val="1672123786"/>
       </p:ext>
     </p:extLst>
   </p:cSld>

</xml_diff>